<commit_message>
English version complete, before corrections
</commit_message>
<xml_diff>
--- a/Documentations/InEnglish/MusicalTreeRo.pptx
+++ b/Documentations/InEnglish/MusicalTreeRo.pptx
@@ -3956,7 +3956,7 @@
           <a:p>
             <a:pPr fontAlgn="base"/>
             <a:r>
-              <a:rPr lang="ro-RO" altLang="en-US" sz="3600" strike="noStrike" noProof="1">
+              <a:rPr sz="3600">
                 <a:solidFill>
                   <a:schemeClr val="tx1">
                     <a:lumMod val="65000"/>
@@ -3967,7 +3967,35 @@
                 <a:ea typeface="Gungsuh" panose="02030600000101010101" charset="-127"/>
                 <a:sym typeface="+mn-ea"/>
               </a:rPr>
-              <a:t>Schema fizică</a:t>
+              <a:t>Physical </a:t>
+            </a:r>
+            <a:r>
+              <a:rPr lang="ro-RO" sz="3600">
+                <a:solidFill>
+                  <a:schemeClr val="tx1">
+                    <a:lumMod val="65000"/>
+                    <a:lumOff val="35000"/>
+                  </a:schemeClr>
+                </a:solidFill>
+                <a:latin typeface="Gungsuh" panose="02030600000101010101" charset="-127"/>
+                <a:ea typeface="Gungsuh" panose="02030600000101010101" charset="-127"/>
+                <a:sym typeface="+mn-ea"/>
+              </a:rPr>
+              <a:t>Final </a:t>
+            </a:r>
+            <a:r>
+              <a:rPr sz="3600">
+                <a:solidFill>
+                  <a:schemeClr val="tx1">
+                    <a:lumMod val="65000"/>
+                    <a:lumOff val="35000"/>
+                  </a:schemeClr>
+                </a:solidFill>
+                <a:latin typeface="Gungsuh" panose="02030600000101010101" charset="-127"/>
+                <a:ea typeface="Gungsuh" panose="02030600000101010101" charset="-127"/>
+                <a:sym typeface="+mn-ea"/>
+              </a:rPr>
+              <a:t>Design</a:t>
             </a:r>
             <a:endParaRPr lang="ro-RO" altLang="en-US" sz="3600" strike="noStrike" noProof="1">
               <a:solidFill>
@@ -4549,7 +4577,7 @@
               <a:buNone/>
             </a:pPr>
             <a:r>
-              <a:rPr lang="en-US" sz="2400">
+              <a:rPr sz="2400">
                 <a:solidFill>
                   <a:schemeClr val="tx1">
                     <a:lumMod val="65000"/>
@@ -4560,10 +4588,10 @@
                 <a:ea typeface="Gungsuh" panose="02030600000101010101" charset="-127"/>
                 <a:sym typeface="+mn-ea"/>
               </a:rPr>
-              <a:t>Ini</a:t>
-            </a:r>
-            <a:r>
-              <a:rPr lang="ro-RO" altLang="en-US" sz="2400">
+              <a:t>Timer0 initialization:</a:t>
+            </a:r>
+            <a:r>
+              <a:rPr lang="en-US" sz="2400">
                 <a:solidFill>
                   <a:schemeClr val="tx1">
                     <a:lumMod val="65000"/>
@@ -4574,21 +4602,7 @@
                 <a:ea typeface="Gungsuh" panose="02030600000101010101" charset="-127"/>
                 <a:sym typeface="+mn-ea"/>
               </a:rPr>
-              <a:t>ţ</a:t>
-            </a:r>
-            <a:r>
-              <a:rPr lang="en-US" sz="2400">
-                <a:solidFill>
-                  <a:schemeClr val="tx1">
-                    <a:lumMod val="65000"/>
-                    <a:lumOff val="35000"/>
-                  </a:schemeClr>
-                </a:solidFill>
-                <a:latin typeface="Gungsuh" panose="02030600000101010101" charset="-127"/>
-                <a:ea typeface="Gungsuh" panose="02030600000101010101" charset="-127"/>
-                <a:sym typeface="+mn-ea"/>
-              </a:rPr>
-              <a:t>ializare Timer0:</a:t>
+              <a:t>:</a:t>
             </a:r>
             <a:endParaRPr lang="en-US" sz="2400" strike="noStrike" noProof="1">
               <a:solidFill>
@@ -4652,7 +4666,7 @@
           <a:p>
             <a:pPr fontAlgn="base"/>
             <a:r>
-              <a:rPr lang="en-US" altLang="ro-RO" sz="3600" strike="noStrike" noProof="1">
+              <a:rPr lang="ro-RO" altLang="en-US" sz="3600" strike="noStrike" noProof="1">
                 <a:solidFill>
                   <a:schemeClr val="tx1">
                     <a:lumMod val="65000"/>
@@ -4663,9 +4677,9 @@
                 <a:ea typeface="Gungsuh" panose="02030600000101010101" charset="-127"/>
                 <a:sym typeface="+mn-ea"/>
               </a:rPr>
-              <a:t>Codul</a:t>
-            </a:r>
-            <a:endParaRPr lang="en-US" altLang="ro-RO" sz="3600" strike="noStrike" noProof="1">
+              <a:t>The code</a:t>
+            </a:r>
+            <a:endParaRPr lang="ro-RO" altLang="en-US" sz="3600" strike="noStrike" noProof="1">
               <a:solidFill>
                 <a:schemeClr val="tx1">
                   <a:lumMod val="65000"/>
@@ -5287,7 +5301,7 @@
               <a:t>// </a:t>
             </a:r>
             <a:r>
-              <a:rPr lang="en-US" altLang="zh-CN" sz="1800">
+              <a:rPr sz="1800">
                 <a:solidFill>
                   <a:schemeClr val="tx1">
                     <a:lumMod val="50000"/>
@@ -5298,65 +5312,9 @@
                 <a:cs typeface="Segoe UI" panose="020B0502040204020203" charset="0"/>
                 <a:sym typeface="Arial" panose="020B0604020202020204" pitchFamily="34" charset="0"/>
               </a:rPr>
-              <a:t>Activeaz</a:t>
-            </a:r>
-            <a:r>
-              <a:rPr lang="ro-RO" altLang="en-US" sz="1800">
-                <a:solidFill>
-                  <a:schemeClr val="tx1">
-                    <a:lumMod val="50000"/>
-                    <a:lumOff val="50000"/>
-                  </a:schemeClr>
-                </a:solidFill>
-                <a:latin typeface="Segoe UI" panose="020B0502040204020203" charset="0"/>
-                <a:cs typeface="Segoe UI" panose="020B0502040204020203" charset="0"/>
-                <a:sym typeface="Arial" panose="020B0604020202020204" pitchFamily="34" charset="0"/>
-              </a:rPr>
-              <a:t>ă</a:t>
-            </a:r>
-            <a:r>
-              <a:rPr lang="en-US" altLang="zh-CN" sz="1800">
-                <a:solidFill>
-                  <a:schemeClr val="tx1">
-                    <a:lumMod val="50000"/>
-                    <a:lumOff val="50000"/>
-                  </a:schemeClr>
-                </a:solidFill>
-                <a:latin typeface="Segoe UI" panose="020B0502040204020203" charset="0"/>
-                <a:cs typeface="Segoe UI" panose="020B0502040204020203" charset="0"/>
-                <a:sym typeface="Arial" panose="020B0604020202020204" pitchFamily="34" charset="0"/>
-              </a:rPr>
-              <a:t> </a:t>
-            </a:r>
-            <a:r>
-              <a:rPr lang="ro-RO" altLang="en-US" sz="1800">
-                <a:solidFill>
-                  <a:schemeClr val="tx1">
-                    <a:lumMod val="50000"/>
-                    <a:lumOff val="50000"/>
-                  </a:schemeClr>
-                </a:solidFill>
-                <a:latin typeface="Segoe UI" panose="020B0502040204020203" charset="0"/>
-                <a:cs typeface="Segoe UI" panose="020B0502040204020203" charset="0"/>
-                <a:sym typeface="Arial" panose="020B0604020202020204" pitchFamily="34" charset="0"/>
-              </a:rPr>
-              <a:t>î</a:t>
-            </a:r>
-            <a:r>
-              <a:rPr lang="en-US" altLang="zh-CN" sz="1800">
-                <a:solidFill>
-                  <a:schemeClr val="tx1">
-                    <a:lumMod val="50000"/>
-                    <a:lumOff val="50000"/>
-                  </a:schemeClr>
-                </a:solidFill>
-                <a:latin typeface="Segoe UI" panose="020B0502040204020203" charset="0"/>
-                <a:cs typeface="Segoe UI" panose="020B0502040204020203" charset="0"/>
-                <a:sym typeface="Arial" panose="020B0604020202020204" pitchFamily="34" charset="0"/>
-              </a:rPr>
-              <a:t>ntreruperile globale</a:t>
-            </a:r>
-            <a:endParaRPr lang="en-US" altLang="zh-CN" sz="1800">
+              <a:t>Global Interrupt Enable</a:t>
+            </a:r>
+            <a:endParaRPr sz="1800">
               <a:solidFill>
                 <a:schemeClr val="tx1">
                   <a:lumMod val="50000"/>
@@ -5365,24 +5323,7 @@
               </a:solidFill>
               <a:latin typeface="Segoe UI" panose="020B0502040204020203" charset="0"/>
               <a:cs typeface="Segoe UI" panose="020B0502040204020203" charset="0"/>
-            </a:endParaRPr>
-          </a:p>
-          <a:p>
-            <a:pPr marL="0" indent="0">
-              <a:buClrTx/>
-              <a:buSzTx/>
-              <a:buFontTx/>
-              <a:buNone/>
-            </a:pPr>
-            <a:endParaRPr lang="en-US" altLang="zh-CN" sz="2000">
-              <a:solidFill>
-                <a:schemeClr val="tx1">
-                  <a:lumMod val="50000"/>
-                  <a:lumOff val="50000"/>
-                </a:schemeClr>
-              </a:solidFill>
-              <a:latin typeface="Segoe UI" panose="020B0502040204020203" charset="0"/>
-              <a:cs typeface="Segoe UI" panose="020B0502040204020203" charset="0"/>
+              <a:sym typeface="Arial" panose="020B0604020202020204" pitchFamily="34" charset="0"/>
             </a:endParaRPr>
           </a:p>
           <a:p>
@@ -5462,7 +5403,49 @@
                 <a:cs typeface="Segoe UI" panose="020B0502040204020203" charset="0"/>
                 <a:sym typeface="+mn-ea"/>
               </a:rPr>
-              <a:t>//Port normal de operare</a:t>
+              <a:t>//</a:t>
+            </a:r>
+            <a:r>
+              <a:rPr lang="ro-RO" altLang="en-US">
+                <a:solidFill>
+                  <a:schemeClr val="tx1">
+                    <a:lumMod val="50000"/>
+                    <a:lumOff val="50000"/>
+                  </a:schemeClr>
+                </a:solidFill>
+                <a:latin typeface="Segoe UI" panose="020B0502040204020203" charset="0"/>
+                <a:cs typeface="Segoe UI" panose="020B0502040204020203" charset="0"/>
+                <a:sym typeface="+mn-ea"/>
+              </a:rPr>
+              <a:t>n</a:t>
+            </a:r>
+            <a:r>
+              <a:rPr lang="en-US" altLang="zh-CN">
+                <a:solidFill>
+                  <a:schemeClr val="tx1">
+                    <a:lumMod val="50000"/>
+                    <a:lumOff val="50000"/>
+                  </a:schemeClr>
+                </a:solidFill>
+                <a:latin typeface="Segoe UI" panose="020B0502040204020203" charset="0"/>
+                <a:cs typeface="Segoe UI" panose="020B0502040204020203" charset="0"/>
+                <a:sym typeface="+mn-ea"/>
+              </a:rPr>
+              <a:t>ormal port operation</a:t>
+            </a:r>
+            <a:r>
+              <a:rPr lang="ro-RO" altLang="en-US">
+                <a:solidFill>
+                  <a:schemeClr val="tx1">
+                    <a:lumMod val="50000"/>
+                    <a:lumOff val="50000"/>
+                  </a:schemeClr>
+                </a:solidFill>
+                <a:latin typeface="Segoe UI" panose="020B0502040204020203" charset="0"/>
+                <a:cs typeface="Segoe UI" panose="020B0502040204020203" charset="0"/>
+                <a:sym typeface="+mn-ea"/>
+              </a:rPr>
+              <a:t>,</a:t>
             </a:r>
             <a:endParaRPr lang="en-US" altLang="zh-CN">
               <a:solidFill>
@@ -5495,10 +5478,10 @@
                 <a:cs typeface="Segoe UI" panose="020B0502040204020203" charset="0"/>
                 <a:sym typeface="+mn-ea"/>
               </a:rPr>
-              <a:t>//OC0A </a:t>
-            </a:r>
-            <a:r>
-              <a:rPr lang="ro-RO" altLang="en-US">
+              <a:t>//</a:t>
+            </a:r>
+            <a:r>
+              <a:rPr>
                 <a:solidFill>
                   <a:schemeClr val="tx1">
                     <a:lumMod val="50000"/>
@@ -5509,10 +5492,10 @@
                 <a:cs typeface="Segoe UI" panose="020B0502040204020203" charset="0"/>
                 <a:sym typeface="+mn-ea"/>
               </a:rPr>
-              <a:t>ş</a:t>
-            </a:r>
-            <a:r>
-              <a:rPr lang="en-US" altLang="zh-CN">
+              <a:t> OC0A si OC0B disconnect</a:t>
+            </a:r>
+            <a:r>
+              <a:rPr lang="ro-RO">
                 <a:solidFill>
                   <a:schemeClr val="tx1">
                     <a:lumMod val="50000"/>
@@ -5523,10 +5506,29 @@
                 <a:cs typeface="Segoe UI" panose="020B0502040204020203" charset="0"/>
                 <a:sym typeface="+mn-ea"/>
               </a:rPr>
-              <a:t>i OC0B deconecta</a:t>
-            </a:r>
-            <a:r>
-              <a:rPr lang="ro-RO" altLang="en-US">
+              <a:t>,</a:t>
+            </a:r>
+            <a:endParaRPr>
+              <a:solidFill>
+                <a:schemeClr val="tx1">
+                  <a:lumMod val="50000"/>
+                  <a:lumOff val="50000"/>
+                </a:schemeClr>
+              </a:solidFill>
+              <a:latin typeface="Segoe UI" panose="020B0502040204020203" charset="0"/>
+              <a:cs typeface="Segoe UI" panose="020B0502040204020203" charset="0"/>
+              <a:sym typeface="+mn-ea"/>
+            </a:endParaRPr>
+          </a:p>
+          <a:p>
+            <a:pPr marL="0" indent="0" algn="l">
+              <a:buClrTx/>
+              <a:buSzTx/>
+              <a:buFontTx/>
+              <a:buNone/>
+            </a:pPr>
+            <a:r>
+              <a:rPr lang="en-US" altLang="zh-CN">
                 <a:solidFill>
                   <a:schemeClr val="tx1">
                     <a:lumMod val="50000"/>
@@ -5537,10 +5539,10 @@
                 <a:cs typeface="Segoe UI" panose="020B0502040204020203" charset="0"/>
                 <a:sym typeface="+mn-ea"/>
               </a:rPr>
-              <a:t>ţ</a:t>
-            </a:r>
-            <a:r>
-              <a:rPr lang="en-US" altLang="zh-CN">
+              <a:t>//CTC with OCRA</a:t>
+            </a:r>
+            <a:r>
+              <a:rPr lang="ro-RO" altLang="en-US">
                 <a:solidFill>
                   <a:schemeClr val="tx1">
                     <a:lumMod val="50000"/>
@@ -5551,7 +5553,7 @@
                 <a:cs typeface="Segoe UI" panose="020B0502040204020203" charset="0"/>
                 <a:sym typeface="+mn-ea"/>
               </a:rPr>
-              <a:t>i</a:t>
+              <a:t>,</a:t>
             </a:r>
             <a:endParaRPr lang="en-US" altLang="zh-CN">
               <a:solidFill>
@@ -5584,7 +5586,7 @@
                 <a:cs typeface="Segoe UI" panose="020B0502040204020203" charset="0"/>
                 <a:sym typeface="+mn-ea"/>
               </a:rPr>
-              <a:t>//CTC cu OC0RA,</a:t>
+              <a:t>//64 prescaler</a:t>
             </a:r>
             <a:endParaRPr lang="en-US" altLang="zh-CN">
               <a:solidFill>
@@ -5598,29 +5600,6 @@
               <a:sym typeface="+mn-ea"/>
             </a:endParaRPr>
           </a:p>
-          <a:p>
-            <a:pPr marL="0" indent="0" algn="l">
-              <a:buClrTx/>
-              <a:buSzTx/>
-              <a:buFontTx/>
-              <a:buNone/>
-            </a:pPr>
-            <a:r>
-              <a:rPr lang="en-US" altLang="zh-CN">
-                <a:solidFill>
-                  <a:schemeClr val="tx1">
-                    <a:lumMod val="50000"/>
-                    <a:lumOff val="50000"/>
-                  </a:schemeClr>
-                </a:solidFill>
-                <a:latin typeface="Segoe UI" panose="020B0502040204020203" charset="0"/>
-                <a:cs typeface="Segoe UI" panose="020B0502040204020203" charset="0"/>
-                <a:sym typeface="+mn-ea"/>
-              </a:rPr>
-              <a:t>//prescaler de 64</a:t>
-            </a:r>
-            <a:endParaRPr lang="en-US"/>
-          </a:p>
         </p:txBody>
       </p:sp>
       <p:sp>
@@ -5632,7 +5611,7 @@
         <p:spPr>
           <a:xfrm>
             <a:off x="3572510" y="4560570"/>
-            <a:ext cx="3405505" cy="1476375"/>
+            <a:ext cx="3325495" cy="1198880"/>
           </a:xfrm>
           <a:prstGeom prst="rect">
             <a:avLst/>
@@ -5662,10 +5641,10 @@
                 <a:cs typeface="Segoe UI" panose="020B0502040204020203" charset="0"/>
                 <a:sym typeface="+mn-ea"/>
               </a:rPr>
-              <a:t>//Activeaz</a:t>
-            </a:r>
-            <a:r>
-              <a:rPr lang="ro-RO" altLang="en-US">
+              <a:t>//</a:t>
+            </a:r>
+            <a:r>
+              <a:rPr>
                 <a:solidFill>
                   <a:schemeClr val="tx1">
                     <a:lumMod val="50000"/>
@@ -5676,8 +5655,27 @@
                 <a:cs typeface="Segoe UI" panose="020B0502040204020203" charset="0"/>
                 <a:sym typeface="+mn-ea"/>
               </a:rPr>
-              <a:t>ă</a:t>
-            </a:r>
+              <a:t>Enables internal </a:t>
+            </a:r>
+            <a:endParaRPr>
+              <a:solidFill>
+                <a:schemeClr val="tx1">
+                  <a:lumMod val="50000"/>
+                  <a:lumOff val="50000"/>
+                </a:schemeClr>
+              </a:solidFill>
+              <a:latin typeface="Segoe UI" panose="020B0502040204020203" charset="0"/>
+              <a:cs typeface="Segoe UI" panose="020B0502040204020203" charset="0"/>
+              <a:sym typeface="+mn-ea"/>
+            </a:endParaRPr>
+          </a:p>
+          <a:p>
+            <a:pPr marL="0" indent="0" algn="l">
+              <a:buClrTx/>
+              <a:buSzTx/>
+              <a:buFontTx/>
+              <a:buNone/>
+            </a:pPr>
             <a:r>
               <a:rPr lang="en-US" altLang="zh-CN">
                 <a:solidFill>
@@ -5690,10 +5688,10 @@
                 <a:cs typeface="Segoe UI" panose="020B0502040204020203" charset="0"/>
                 <a:sym typeface="+mn-ea"/>
               </a:rPr>
-              <a:t> </a:t>
-            </a:r>
-            <a:r>
-              <a:rPr lang="ro-RO" altLang="en-US">
+              <a:t>//</a:t>
+            </a:r>
+            <a:r>
+              <a:rPr>
                 <a:solidFill>
                   <a:schemeClr val="tx1">
                     <a:lumMod val="50000"/>
@@ -5704,8 +5702,27 @@
                 <a:cs typeface="Segoe UI" panose="020B0502040204020203" charset="0"/>
                 <a:sym typeface="+mn-ea"/>
               </a:rPr>
-              <a:t>î</a:t>
-            </a:r>
+              <a:t>output comparison interrupts</a:t>
+            </a:r>
+            <a:endParaRPr>
+              <a:solidFill>
+                <a:schemeClr val="tx1">
+                  <a:lumMod val="50000"/>
+                  <a:lumOff val="50000"/>
+                </a:schemeClr>
+              </a:solidFill>
+              <a:latin typeface="Segoe UI" panose="020B0502040204020203" charset="0"/>
+              <a:cs typeface="Segoe UI" panose="020B0502040204020203" charset="0"/>
+              <a:sym typeface="+mn-ea"/>
+            </a:endParaRPr>
+          </a:p>
+          <a:p>
+            <a:pPr marL="0" indent="0" algn="l">
+              <a:buClrTx/>
+              <a:buSzTx/>
+              <a:buFontTx/>
+              <a:buNone/>
+            </a:pPr>
             <a:r>
               <a:rPr lang="en-US" altLang="zh-CN">
                 <a:solidFill>
@@ -5718,7 +5735,7 @@
                 <a:cs typeface="Segoe UI" panose="020B0502040204020203" charset="0"/>
                 <a:sym typeface="+mn-ea"/>
               </a:rPr>
-              <a:t>ntreruperile </a:t>
+              <a:t>// for OCR0A</a:t>
             </a:r>
             <a:endParaRPr lang="en-US" altLang="zh-CN">
               <a:solidFill>
@@ -5733,110 +5750,6 @@
             </a:endParaRPr>
           </a:p>
           <a:p>
-            <a:pPr marL="0" indent="0" algn="l">
-              <a:buClrTx/>
-              <a:buSzTx/>
-              <a:buFontTx/>
-              <a:buNone/>
-            </a:pPr>
-            <a:r>
-              <a:rPr lang="en-US" altLang="zh-CN">
-                <a:solidFill>
-                  <a:schemeClr val="tx1">
-                    <a:lumMod val="50000"/>
-                    <a:lumOff val="50000"/>
-                  </a:schemeClr>
-                </a:solidFill>
-                <a:latin typeface="Segoe UI" panose="020B0502040204020203" charset="0"/>
-                <a:cs typeface="Segoe UI" panose="020B0502040204020203" charset="0"/>
-                <a:sym typeface="+mn-ea"/>
-              </a:rPr>
-              <a:t>//interne de comparare la ie</a:t>
-            </a:r>
-            <a:r>
-              <a:rPr lang="ro-RO" altLang="en-US">
-                <a:solidFill>
-                  <a:schemeClr val="tx1">
-                    <a:lumMod val="50000"/>
-                    <a:lumOff val="50000"/>
-                  </a:schemeClr>
-                </a:solidFill>
-                <a:latin typeface="Segoe UI" panose="020B0502040204020203" charset="0"/>
-                <a:cs typeface="Segoe UI" panose="020B0502040204020203" charset="0"/>
-                <a:sym typeface="+mn-ea"/>
-              </a:rPr>
-              <a:t>ş</a:t>
-            </a:r>
-            <a:r>
-              <a:rPr lang="en-US" altLang="zh-CN">
-                <a:solidFill>
-                  <a:schemeClr val="tx1">
-                    <a:lumMod val="50000"/>
-                    <a:lumOff val="50000"/>
-                  </a:schemeClr>
-                </a:solidFill>
-                <a:latin typeface="Segoe UI" panose="020B0502040204020203" charset="0"/>
-                <a:cs typeface="Segoe UI" panose="020B0502040204020203" charset="0"/>
-                <a:sym typeface="+mn-ea"/>
-              </a:rPr>
-              <a:t>ire </a:t>
-            </a:r>
-            <a:endParaRPr lang="en-US" altLang="zh-CN">
-              <a:solidFill>
-                <a:schemeClr val="tx1">
-                  <a:lumMod val="50000"/>
-                  <a:lumOff val="50000"/>
-                </a:schemeClr>
-              </a:solidFill>
-              <a:latin typeface="Segoe UI" panose="020B0502040204020203" charset="0"/>
-              <a:cs typeface="Segoe UI" panose="020B0502040204020203" charset="0"/>
-              <a:sym typeface="+mn-ea"/>
-            </a:endParaRPr>
-          </a:p>
-          <a:p>
-            <a:pPr marL="0" indent="0" algn="l">
-              <a:buClrTx/>
-              <a:buSzTx/>
-              <a:buFontTx/>
-              <a:buNone/>
-            </a:pPr>
-            <a:r>
-              <a:rPr lang="en-US" altLang="zh-CN">
-                <a:solidFill>
-                  <a:schemeClr val="tx1">
-                    <a:lumMod val="50000"/>
-                    <a:lumOff val="50000"/>
-                  </a:schemeClr>
-                </a:solidFill>
-                <a:latin typeface="Segoe UI" panose="020B0502040204020203" charset="0"/>
-                <a:cs typeface="Segoe UI" panose="020B0502040204020203" charset="0"/>
-                <a:sym typeface="+mn-ea"/>
-              </a:rPr>
-              <a:t>//pentru OCR0A</a:t>
-            </a:r>
-            <a:endParaRPr lang="en-US" altLang="zh-CN">
-              <a:solidFill>
-                <a:schemeClr val="tx1">
-                  <a:lumMod val="50000"/>
-                  <a:lumOff val="50000"/>
-                </a:schemeClr>
-              </a:solidFill>
-              <a:latin typeface="Segoe UI" panose="020B0502040204020203" charset="0"/>
-              <a:cs typeface="Segoe UI" panose="020B0502040204020203" charset="0"/>
-            </a:endParaRPr>
-          </a:p>
-          <a:p>
-            <a:pPr algn="l"/>
-            <a:endParaRPr lang="en-US">
-              <a:solidFill>
-                <a:schemeClr val="tx1">
-                  <a:lumMod val="50000"/>
-                  <a:lumOff val="50000"/>
-                </a:schemeClr>
-              </a:solidFill>
-            </a:endParaRPr>
-          </a:p>
-          <a:p>
             <a:endParaRPr lang="en-US">
               <a:solidFill>
                 <a:schemeClr val="tx1">
@@ -5857,7 +5770,7 @@
         <p:spPr>
           <a:xfrm>
             <a:off x="1916430" y="3655060"/>
-            <a:ext cx="3187065" cy="368300"/>
+            <a:ext cx="2853055" cy="368300"/>
           </a:xfrm>
           <a:prstGeom prst="rect">
             <a:avLst/>
@@ -5887,10 +5800,10 @@
                 <a:cs typeface="Segoe UI" panose="020B0502040204020203" charset="0"/>
                 <a:sym typeface="+mn-ea"/>
               </a:rPr>
-              <a:t>//registru de num</a:t>
-            </a:r>
-            <a:r>
-              <a:rPr lang="ro-RO" altLang="en-US">
+              <a:t>//</a:t>
+            </a:r>
+            <a:r>
+              <a:rPr lang="en-US" altLang="zh-CN">
                 <a:solidFill>
                   <a:schemeClr val="tx1">
                     <a:lumMod val="50000"/>
@@ -5901,10 +5814,10 @@
                 <a:cs typeface="Segoe UI" panose="020B0502040204020203" charset="0"/>
                 <a:sym typeface="+mn-ea"/>
               </a:rPr>
-              <a:t>ă</a:t>
-            </a:r>
-            <a:r>
-              <a:rPr lang="en-US" altLang="zh-CN">
+              <a:t>timer0</a:t>
+            </a:r>
+            <a:r>
+              <a:rPr lang="ro-RO" altLang="en-US">
                 <a:solidFill>
                   <a:schemeClr val="tx1">
                     <a:lumMod val="50000"/>
@@ -5915,7 +5828,35 @@
                 <a:cs typeface="Segoe UI" panose="020B0502040204020203" charset="0"/>
                 <a:sym typeface="+mn-ea"/>
               </a:rPr>
-              <a:t>rare timer0</a:t>
+              <a:t> </a:t>
+            </a:r>
+            <a:r>
+              <a:rPr>
+                <a:solidFill>
+                  <a:schemeClr val="tx1">
+                    <a:lumMod val="50000"/>
+                    <a:lumOff val="50000"/>
+                  </a:schemeClr>
+                </a:solidFill>
+                <a:latin typeface="Segoe UI" panose="020B0502040204020203" charset="0"/>
+                <a:cs typeface="Segoe UI" panose="020B0502040204020203" charset="0"/>
+                <a:sym typeface="+mn-ea"/>
+              </a:rPr>
+              <a:t>counting register</a:t>
+            </a:r>
+            <a:r>
+              <a:rPr lang="en-US" altLang="zh-CN">
+                <a:solidFill>
+                  <a:schemeClr val="tx1">
+                    <a:lumMod val="50000"/>
+                    <a:lumOff val="50000"/>
+                  </a:schemeClr>
+                </a:solidFill>
+                <a:latin typeface="Segoe UI" panose="020B0502040204020203" charset="0"/>
+                <a:cs typeface="Segoe UI" panose="020B0502040204020203" charset="0"/>
+                <a:sym typeface="+mn-ea"/>
+              </a:rPr>
+              <a:t> </a:t>
             </a:r>
             <a:endParaRPr lang="en-US" altLang="zh-CN">
               <a:solidFill>
@@ -6219,10 +6160,10 @@
                 <a:ea typeface="Gungsuh" panose="02030600000101010101" charset="-127"/>
                 <a:sym typeface="+mn-ea"/>
               </a:rPr>
-              <a:t>Ini</a:t>
-            </a:r>
-            <a:r>
-              <a:rPr lang="ro-RO" altLang="en-US" sz="2400">
+              <a:t>I</a:t>
+            </a:r>
+            <a:r>
+              <a:rPr lang="ro-RO" sz="2400">
                 <a:solidFill>
                   <a:schemeClr val="tx1">
                     <a:lumMod val="65000"/>
@@ -6233,7 +6174,7 @@
                 <a:ea typeface="Gungsuh" panose="02030600000101010101" charset="-127"/>
                 <a:sym typeface="+mn-ea"/>
               </a:rPr>
-              <a:t>ţ</a:t>
+              <a:t>nterrupts </a:t>
             </a:r>
             <a:r>
               <a:rPr lang="en-US" sz="2400">
@@ -6247,7 +6188,7 @@
                 <a:ea typeface="Gungsuh" panose="02030600000101010101" charset="-127"/>
                 <a:sym typeface="+mn-ea"/>
               </a:rPr>
-              <a:t>ializare </a:t>
+              <a:t>i</a:t>
             </a:r>
             <a:r>
               <a:rPr lang="ro-RO" altLang="en-US" sz="2400">
@@ -6261,7 +6202,7 @@
                 <a:ea typeface="Gungsuh" panose="02030600000101010101" charset="-127"/>
                 <a:sym typeface="+mn-ea"/>
               </a:rPr>
-              <a:t>î</a:t>
+              <a:t>nitialization</a:t>
             </a:r>
             <a:r>
               <a:rPr lang="en-US" sz="2400">
@@ -6275,7 +6216,7 @@
                 <a:ea typeface="Gungsuh" panose="02030600000101010101" charset="-127"/>
                 <a:sym typeface="+mn-ea"/>
               </a:rPr>
-              <a:t>ntreruperi:</a:t>
+              <a:t>:</a:t>
             </a:r>
             <a:endParaRPr lang="en-US" sz="2400" strike="noStrike" noProof="1">
               <a:solidFill>
@@ -6300,7 +6241,7 @@
         <p:spPr>
           <a:xfrm>
             <a:off x="3212465" y="7039610"/>
-            <a:ext cx="3411220" cy="368300"/>
+            <a:ext cx="3531235" cy="368300"/>
           </a:xfrm>
           <a:prstGeom prst="rect">
             <a:avLst/>
@@ -6312,7 +6253,7 @@
             <a:spAutoFit/>
           </a:bodyPr>
           <a:p>
-            <a:pPr marL="0" indent="0">
+            <a:pPr marL="0" indent="0" algn="l">
               <a:buClrTx/>
               <a:buSzTx/>
               <a:buFontTx/>
@@ -6330,10 +6271,10 @@
                 <a:cs typeface="Segoe UI" panose="020B0502040204020203" charset="0"/>
                 <a:sym typeface="+mn-ea"/>
               </a:rPr>
-              <a:t>//Activeaz</a:t>
-            </a:r>
-            <a:r>
-              <a:rPr lang="ro-RO" altLang="en-US">
+              <a:t>//</a:t>
+            </a:r>
+            <a:r>
+              <a:rPr>
                 <a:solidFill>
                   <a:schemeClr val="tx1">
                     <a:lumMod val="50000"/>
@@ -6344,51 +6285,9 @@
                 <a:cs typeface="Segoe UI" panose="020B0502040204020203" charset="0"/>
                 <a:sym typeface="+mn-ea"/>
               </a:rPr>
-              <a:t>ă</a:t>
-            </a:r>
-            <a:r>
-              <a:rPr lang="en-US" altLang="zh-CN">
-                <a:solidFill>
-                  <a:schemeClr val="tx1">
-                    <a:lumMod val="50000"/>
-                    <a:lumOff val="50000"/>
-                  </a:schemeClr>
-                </a:solidFill>
-                <a:latin typeface="Segoe UI" panose="020B0502040204020203" charset="0"/>
-                <a:cs typeface="Segoe UI" panose="020B0502040204020203" charset="0"/>
-                <a:sym typeface="+mn-ea"/>
-              </a:rPr>
-              <a:t> </a:t>
-            </a:r>
-            <a:r>
-              <a:rPr lang="ro-RO" altLang="en-US">
-                <a:solidFill>
-                  <a:schemeClr val="tx1">
-                    <a:lumMod val="50000"/>
-                    <a:lumOff val="50000"/>
-                  </a:schemeClr>
-                </a:solidFill>
-                <a:latin typeface="Segoe UI" panose="020B0502040204020203" charset="0"/>
-                <a:cs typeface="Segoe UI" panose="020B0502040204020203" charset="0"/>
-                <a:sym typeface="+mn-ea"/>
-              </a:rPr>
-              <a:t>î</a:t>
-            </a:r>
-            <a:r>
-              <a:rPr lang="en-US" altLang="zh-CN">
-                <a:solidFill>
-                  <a:schemeClr val="tx1">
-                    <a:lumMod val="50000"/>
-                    <a:lumOff val="50000"/>
-                  </a:schemeClr>
-                </a:solidFill>
-                <a:latin typeface="Segoe UI" panose="020B0502040204020203" charset="0"/>
-                <a:cs typeface="Segoe UI" panose="020B0502040204020203" charset="0"/>
-                <a:sym typeface="+mn-ea"/>
-              </a:rPr>
-              <a:t>ntreruperile externe</a:t>
-            </a:r>
-            <a:endParaRPr lang="en-US" altLang="zh-CN">
+              <a:t>acvtivate the external interrupts</a:t>
+            </a:r>
+            <a:endParaRPr>
               <a:solidFill>
                 <a:schemeClr val="tx1">
                   <a:lumMod val="50000"/>
@@ -6411,7 +6310,7 @@
         <p:spPr>
           <a:xfrm>
             <a:off x="3140710" y="7615555"/>
-            <a:ext cx="3379470" cy="645160"/>
+            <a:ext cx="3230880" cy="645160"/>
           </a:xfrm>
           <a:prstGeom prst="rect">
             <a:avLst/>
@@ -6423,7 +6322,7 @@
             <a:spAutoFit/>
           </a:bodyPr>
           <a:p>
-            <a:pPr marL="0" indent="0">
+            <a:pPr marL="0" indent="0" algn="l">
               <a:buClrTx/>
               <a:buSzTx/>
               <a:buFontTx/>
@@ -6441,10 +6340,10 @@
                 <a:cs typeface="Segoe UI" panose="020B0502040204020203" charset="0"/>
                 <a:sym typeface="+mn-ea"/>
               </a:rPr>
-              <a:t>//Frontul cresc</a:t>
-            </a:r>
-            <a:r>
-              <a:rPr lang="ro-RO" altLang="en-US">
+              <a:t>//</a:t>
+            </a:r>
+            <a:r>
+              <a:rPr>
                 <a:solidFill>
                   <a:schemeClr val="tx1">
                     <a:lumMod val="50000"/>
@@ -6455,23 +6354,9 @@
                 <a:cs typeface="Segoe UI" panose="020B0502040204020203" charset="0"/>
                 <a:sym typeface="+mn-ea"/>
               </a:rPr>
-              <a:t>ă</a:t>
-            </a:r>
-            <a:r>
-              <a:rPr lang="en-US" altLang="zh-CN">
-                <a:solidFill>
-                  <a:schemeClr val="tx1">
-                    <a:lumMod val="50000"/>
-                    <a:lumOff val="50000"/>
-                  </a:schemeClr>
-                </a:solidFill>
-                <a:latin typeface="Segoe UI" panose="020B0502040204020203" charset="0"/>
-                <a:cs typeface="Segoe UI" panose="020B0502040204020203" charset="0"/>
-                <a:sym typeface="+mn-ea"/>
-              </a:rPr>
-              <a:t>tor pentru INT0 </a:t>
-            </a:r>
-            <a:endParaRPr lang="en-US" altLang="zh-CN">
+              <a:t>positive edge INT0 and INT1</a:t>
+            </a:r>
+            <a:endParaRPr>
               <a:solidFill>
                 <a:schemeClr val="tx1">
                   <a:lumMod val="50000"/>
@@ -6484,7 +6369,7 @@
             </a:endParaRPr>
           </a:p>
           <a:p>
-            <a:pPr marL="0" indent="0">
+            <a:pPr marL="0" indent="0" algn="l">
               <a:buClrTx/>
               <a:buSzTx/>
               <a:buFontTx/>
@@ -6557,14 +6442,28 @@
           <a:p>
             <a:pPr algn="l" fontAlgn="base"/>
             <a:r>
+              <a:rPr lang="ro-RO" sz="2400" strike="noStrike" noProof="1">
+                <a:latin typeface="Gungsuh" panose="02030600000101010101" charset="-127"/>
+                <a:ea typeface="Gungsuh" panose="02030600000101010101" charset="-127"/>
+              </a:rPr>
+              <a:t>B</a:t>
+            </a:r>
+            <a:r>
               <a:rPr lang="en-US" sz="2400" strike="noStrike" noProof="1">
                 <a:latin typeface="Gungsuh" panose="02030600000101010101" charset="-127"/>
                 <a:ea typeface="Gungsuh" panose="02030600000101010101" charset="-127"/>
               </a:rPr>
-              <a:t>Ini</a:t>
-            </a:r>
-            <a:r>
-              <a:rPr lang="ro-RO" altLang="en-US" sz="2400">
+              <a:t>uzzer</a:t>
+            </a:r>
+            <a:r>
+              <a:rPr lang="ro-RO" altLang="en-US" sz="2400" strike="noStrike" noProof="1">
+                <a:latin typeface="Gungsuh" panose="02030600000101010101" charset="-127"/>
+                <a:ea typeface="Gungsuh" panose="02030600000101010101" charset="-127"/>
+              </a:rPr>
+              <a:t> </a:t>
+            </a:r>
+            <a:r>
+              <a:rPr sz="2400">
                 <a:solidFill>
                   <a:schemeClr val="tx1">
                     <a:lumMod val="65000"/>
@@ -6575,14 +6474,14 @@
                 <a:ea typeface="Gungsuh" panose="02030600000101010101" charset="-127"/>
                 <a:sym typeface="+mn-ea"/>
               </a:rPr>
-              <a:t>ț</a:t>
+              <a:t>initialization</a:t>
             </a:r>
             <a:r>
               <a:rPr lang="en-US" sz="2400" strike="noStrike" noProof="1">
                 <a:latin typeface="Gungsuh" panose="02030600000101010101" charset="-127"/>
                 <a:ea typeface="Gungsuh" panose="02030600000101010101" charset="-127"/>
               </a:rPr>
-              <a:t>ializare buzzer:</a:t>
+              <a:t>:</a:t>
             </a:r>
             <a:endParaRPr lang="en-US" sz="2400" strike="noStrike" noProof="1">
               <a:latin typeface="Gungsuh" panose="02030600000101010101" charset="-127"/>
@@ -6861,7 +6760,7 @@
         </p:nvSpPr>
         <p:spPr>
           <a:xfrm>
-            <a:off x="3841115" y="1927225"/>
+            <a:off x="3645535" y="1927225"/>
             <a:ext cx="3157220" cy="1577340"/>
           </a:xfrm>
         </p:spPr>
@@ -6885,10 +6784,28 @@
                 <a:latin typeface="Segoe UI" panose="020B0502040204020203" charset="0"/>
                 <a:cs typeface="Segoe UI" panose="020B0502040204020203" charset="0"/>
               </a:rPr>
-              <a:t>// timerului1: CTC cu OC1A, //prescaler de 8, pinul OC1A //setat ca ie</a:t>
-            </a:r>
-            <a:r>
-              <a:rPr lang="ro-RO" altLang="en-US" sz="1800">
+              <a:t>// the setings for the timer as //CTC, clk/8 prescaler,</a:t>
+            </a:r>
+            <a:endParaRPr lang="en-US" altLang="zh-CN" sz="1800">
+              <a:solidFill>
+                <a:schemeClr val="tx1">
+                  <a:lumMod val="50000"/>
+                  <a:lumOff val="50000"/>
+                </a:schemeClr>
+              </a:solidFill>
+              <a:latin typeface="Segoe UI" panose="020B0502040204020203" charset="0"/>
+              <a:cs typeface="Segoe UI" panose="020B0502040204020203" charset="0"/>
+            </a:endParaRPr>
+          </a:p>
+          <a:p>
+            <a:pPr marL="0" indent="0">
+              <a:buClrTx/>
+              <a:buSzTx/>
+              <a:buFontTx/>
+              <a:buNone/>
+            </a:pPr>
+            <a:r>
+              <a:rPr lang="en-US" altLang="zh-CN" sz="1800">
                 <a:solidFill>
                   <a:schemeClr val="tx1">
                     <a:lumMod val="50000"/>
@@ -6898,10 +6815,10 @@
                 <a:latin typeface="Segoe UI" panose="020B0502040204020203" charset="0"/>
                 <a:cs typeface="Segoe UI" panose="020B0502040204020203" charset="0"/>
               </a:rPr>
-              <a:t>ş</a:t>
-            </a:r>
-            <a:r>
-              <a:rPr lang="en-US" altLang="zh-CN" sz="1800">
+              <a:t>//</a:t>
+            </a:r>
+            <a:r>
+              <a:rPr sz="1800">
                 <a:solidFill>
                   <a:schemeClr val="tx1">
                     <a:lumMod val="50000"/>
@@ -6911,7 +6828,46 @@
                 <a:latin typeface="Segoe UI" panose="020B0502040204020203" charset="0"/>
                 <a:cs typeface="Segoe UI" panose="020B0502040204020203" charset="0"/>
               </a:rPr>
-              <a:t>ire pentru //semnalul PWM </a:t>
+              <a:t>toogle OC1A compare </a:t>
+            </a:r>
+            <a:r>
+              <a:rPr lang="ro-RO" sz="1800">
+                <a:solidFill>
+                  <a:schemeClr val="tx1">
+                    <a:lumMod val="50000"/>
+                    <a:lumOff val="50000"/>
+                  </a:schemeClr>
+                </a:solidFill>
+                <a:latin typeface="Segoe UI" panose="020B0502040204020203" charset="0"/>
+                <a:cs typeface="Segoe UI" panose="020B0502040204020203" charset="0"/>
+              </a:rPr>
+              <a:t>//</a:t>
+            </a:r>
+            <a:r>
+              <a:rPr sz="1800">
+                <a:solidFill>
+                  <a:schemeClr val="tx1">
+                    <a:lumMod val="50000"/>
+                    <a:lumOff val="50000"/>
+                  </a:schemeClr>
+                </a:solidFill>
+                <a:latin typeface="Segoe UI" panose="020B0502040204020203" charset="0"/>
+                <a:cs typeface="Segoe UI" panose="020B0502040204020203" charset="0"/>
+              </a:rPr>
+              <a:t>match</a:t>
+            </a:r>
+            <a:r>
+              <a:rPr lang="en-US" altLang="zh-CN" sz="1800">
+                <a:solidFill>
+                  <a:schemeClr val="tx1">
+                    <a:lumMod val="50000"/>
+                    <a:lumOff val="50000"/>
+                  </a:schemeClr>
+                </a:solidFill>
+                <a:latin typeface="Segoe UI" panose="020B0502040204020203" charset="0"/>
+                <a:cs typeface="Segoe UI" panose="020B0502040204020203" charset="0"/>
+              </a:rPr>
+              <a:t> </a:t>
             </a:r>
             <a:endParaRPr lang="en-US" altLang="zh-CN" sz="1800">
               <a:solidFill>
@@ -6960,10 +6916,10 @@
                 <a:cs typeface="Segoe UI" panose="020B0502040204020203" charset="0"/>
                 <a:sym typeface="+mn-ea"/>
               </a:rPr>
-              <a:t>//PB1 e setat ca ie</a:t>
-            </a:r>
-            <a:r>
-              <a:rPr lang="ro-RO" altLang="en-US">
+              <a:t>//</a:t>
+            </a:r>
+            <a:r>
+              <a:rPr>
                 <a:solidFill>
                   <a:schemeClr val="tx1">
                     <a:lumMod val="50000"/>
@@ -6974,7 +6930,7 @@
                 <a:cs typeface="Segoe UI" panose="020B0502040204020203" charset="0"/>
                 <a:sym typeface="+mn-ea"/>
               </a:rPr>
-              <a:t>ş</a:t>
+              <a:t>PB1 is set as an output</a:t>
             </a:r>
             <a:r>
               <a:rPr lang="en-US" altLang="zh-CN">
@@ -6988,7 +6944,7 @@
                 <a:cs typeface="Segoe UI" panose="020B0502040204020203" charset="0"/>
                 <a:sym typeface="+mn-ea"/>
               </a:rPr>
-              <a:t>ire pentru </a:t>
+              <a:t> </a:t>
             </a:r>
             <a:endParaRPr lang="en-US" altLang="zh-CN">
               <a:solidFill>
@@ -7016,9 +6972,19 @@
                 <a:cs typeface="Segoe UI" panose="020B0502040204020203" charset="0"/>
                 <a:sym typeface="+mn-ea"/>
               </a:rPr>
-              <a:t>//semnalul PWM al buzzerului</a:t>
-            </a:r>
-            <a:endParaRPr lang="en-US"/>
+              <a:t>//for the buzzer's PWM signal</a:t>
+            </a:r>
+            <a:endParaRPr lang="en-US" altLang="zh-CN">
+              <a:solidFill>
+                <a:schemeClr val="tx1">
+                  <a:lumMod val="50000"/>
+                  <a:lumOff val="50000"/>
+                </a:schemeClr>
+              </a:solidFill>
+              <a:latin typeface="Segoe UI" panose="020B0502040204020203" charset="0"/>
+              <a:cs typeface="Segoe UI" panose="020B0502040204020203" charset="0"/>
+              <a:sym typeface="+mn-ea"/>
+            </a:endParaRPr>
           </a:p>
         </p:txBody>
       </p:sp>
@@ -7070,7 +7036,7 @@
           <a:p>
             <a:pPr algn="l" fontAlgn="base"/>
             <a:r>
-              <a:rPr lang="en-US" sz="2400" strike="noStrike" noProof="1">
+              <a:rPr lang="ro-RO" sz="2400" strike="noStrike" noProof="1">
                 <a:solidFill>
                   <a:schemeClr val="tx1">
                     <a:lumMod val="65000"/>
@@ -7080,10 +7046,10 @@
                 <a:latin typeface="Gungsuh" panose="02030600000101010101" charset="-127"/>
                 <a:ea typeface="Gungsuh" panose="02030600000101010101" charset="-127"/>
               </a:rPr>
-              <a:t>In</a:t>
-            </a:r>
-            <a:r>
-              <a:rPr lang="ro-RO" altLang="en-US" sz="2400" strike="noStrike" noProof="1">
+              <a:t>Button </a:t>
+            </a:r>
+            <a:r>
+              <a:rPr sz="2400">
                 <a:solidFill>
                   <a:schemeClr val="tx1">
                     <a:lumMod val="65000"/>
@@ -7092,8 +7058,9 @@
                 </a:solidFill>
                 <a:latin typeface="Gungsuh" panose="02030600000101010101" charset="-127"/>
                 <a:ea typeface="Gungsuh" panose="02030600000101010101" charset="-127"/>
-              </a:rPr>
-              <a:t>iț</a:t>
+                <a:sym typeface="+mn-ea"/>
+              </a:rPr>
+              <a:t>initialization</a:t>
             </a:r>
             <a:r>
               <a:rPr lang="en-US" sz="2400" strike="noStrike" noProof="1">
@@ -7106,7 +7073,7 @@
                 <a:latin typeface="Gungsuh" panose="02030600000101010101" charset="-127"/>
                 <a:ea typeface="Gungsuh" panose="02030600000101010101" charset="-127"/>
               </a:rPr>
-              <a:t>ializare buton:</a:t>
+              <a:t>:</a:t>
             </a:r>
             <a:endParaRPr lang="en-US" sz="2400" strike="noStrike" noProof="1">
               <a:solidFill>
@@ -7307,10 +7274,36 @@
                 <a:latin typeface="Gungsuh" panose="02030600000101010101" charset="-127"/>
                 <a:ea typeface="Gungsuh" panose="02030600000101010101" charset="-127"/>
               </a:rPr>
-              <a:t>Ini</a:t>
-            </a:r>
-            <a:r>
-              <a:rPr lang="ro-RO" altLang="en-US" sz="2400">
+              <a:t>LED</a:t>
+            </a:r>
+            <a:r>
+              <a:rPr lang="ro-RO" altLang="en-US" sz="2400" strike="noStrike" noProof="1">
+                <a:solidFill>
+                  <a:schemeClr val="tx1">
+                    <a:lumMod val="65000"/>
+                    <a:lumOff val="35000"/>
+                  </a:schemeClr>
+                </a:solidFill>
+                <a:latin typeface="Gungsuh" panose="02030600000101010101" charset="-127"/>
+                <a:ea typeface="Gungsuh" panose="02030600000101010101" charset="-127"/>
+              </a:rPr>
+              <a:t>s</a:t>
+            </a:r>
+            <a:r>
+              <a:rPr lang="en-US" altLang="ro-RO" sz="2400" strike="noStrike" noProof="1">
+                <a:solidFill>
+                  <a:schemeClr val="tx1">
+                    <a:lumMod val="65000"/>
+                    <a:lumOff val="35000"/>
+                  </a:schemeClr>
+                </a:solidFill>
+                <a:latin typeface="Gungsuh" panose="02030600000101010101" charset="-127"/>
+                <a:ea typeface="Gungsuh" panose="02030600000101010101" charset="-127"/>
+              </a:rPr>
+              <a:t> </a:t>
+            </a:r>
+            <a:r>
+              <a:rPr sz="2400">
                 <a:solidFill>
                   <a:schemeClr val="tx1">
                     <a:lumMod val="65000"/>
@@ -7321,10 +7314,10 @@
                 <a:ea typeface="Gungsuh" panose="02030600000101010101" charset="-127"/>
                 <a:sym typeface="+mn-ea"/>
               </a:rPr>
-              <a:t>ț</a:t>
-            </a:r>
-            <a:r>
-              <a:rPr lang="en-US" sz="2400" strike="noStrike" noProof="1">
+              <a:t>initialization</a:t>
+            </a:r>
+            <a:r>
+              <a:rPr lang="en-US" altLang="en-US" sz="2400" strike="noStrike" noProof="1">
                 <a:solidFill>
                   <a:schemeClr val="tx1">
                     <a:lumMod val="65000"/>
@@ -7334,9 +7327,9 @@
                 <a:latin typeface="Gungsuh" panose="02030600000101010101" charset="-127"/>
                 <a:ea typeface="Gungsuh" panose="02030600000101010101" charset="-127"/>
               </a:rPr>
-              <a:t>ializare LED-uri</a:t>
-            </a:r>
-            <a:endParaRPr lang="en-US" sz="2400" strike="noStrike" noProof="1">
+              <a:t>:</a:t>
+            </a:r>
+            <a:endParaRPr lang="en-US" altLang="en-US" sz="2400" strike="noStrike" noProof="1">
               <a:solidFill>
                 <a:schemeClr val="tx1">
                   <a:lumMod val="65000"/>
@@ -7357,8 +7350,8 @@
         </p:nvSpPr>
         <p:spPr>
           <a:xfrm>
-            <a:off x="4071620" y="4807585"/>
-            <a:ext cx="2540000" cy="645160"/>
+            <a:off x="3922395" y="4807585"/>
+            <a:ext cx="2935605" cy="645160"/>
           </a:xfrm>
           <a:prstGeom prst="rect">
             <a:avLst/>
@@ -7388,9 +7381,23 @@
                 <a:cs typeface="Segoe UI" panose="020B0502040204020203" charset="0"/>
                 <a:sym typeface="+mn-ea"/>
               </a:rPr>
-              <a:t>//PD2 setat ca intrare</a:t>
-            </a:r>
-            <a:endParaRPr lang="en-US" altLang="zh-CN">
+              <a:t>//PD2 </a:t>
+            </a:r>
+            <a:r>
+              <a:rPr lang="ro-RO" altLang="en-US">
+                <a:solidFill>
+                  <a:schemeClr val="tx1">
+                    <a:lumMod val="50000"/>
+                    <a:lumOff val="50000"/>
+                  </a:schemeClr>
+                </a:solidFill>
+                <a:latin typeface="Segoe UI" panose="020B0502040204020203" charset="0"/>
+                <a:cs typeface="Segoe UI" panose="020B0502040204020203" charset="0"/>
+                <a:sym typeface="+mn-ea"/>
+              </a:rPr>
+              <a:t>- switch the melody</a:t>
+            </a:r>
+            <a:endParaRPr lang="ro-RO" altLang="en-US">
               <a:solidFill>
                 <a:schemeClr val="tx1">
                   <a:lumMod val="50000"/>
@@ -7399,6 +7406,7 @@
               </a:solidFill>
               <a:latin typeface="Segoe UI" panose="020B0502040204020203" charset="0"/>
               <a:cs typeface="Segoe UI" panose="020B0502040204020203" charset="0"/>
+              <a:sym typeface="+mn-ea"/>
             </a:endParaRPr>
           </a:p>
           <a:p>
@@ -8014,10 +8022,10 @@
                 <a:latin typeface="Segoe UI" panose="020B0502040204020203" charset="0"/>
                 <a:cs typeface="Segoe UI" panose="020B0502040204020203" charset="0"/>
               </a:rPr>
-              <a:t>//ie</a:t>
-            </a:r>
-            <a:r>
-              <a:rPr lang="ro-RO" altLang="en-US" sz="1800">
+              <a:t>//</a:t>
+            </a:r>
+            <a:r>
+              <a:rPr lang="en-US" sz="1800">
                 <a:solidFill>
                   <a:schemeClr val="tx1">
                     <a:lumMod val="50000"/>
@@ -8027,8 +8035,26 @@
                 <a:latin typeface="Segoe UI" panose="020B0502040204020203" charset="0"/>
                 <a:cs typeface="Segoe UI" panose="020B0502040204020203" charset="0"/>
               </a:rPr>
-              <a:t>ş</a:t>
-            </a:r>
+              <a:t>yellow output</a:t>
+            </a:r>
+            <a:endParaRPr lang="en-US" sz="1800">
+              <a:solidFill>
+                <a:schemeClr val="tx1">
+                  <a:lumMod val="50000"/>
+                  <a:lumOff val="50000"/>
+                </a:schemeClr>
+              </a:solidFill>
+              <a:latin typeface="Segoe UI" panose="020B0502040204020203" charset="0"/>
+              <a:cs typeface="Segoe UI" panose="020B0502040204020203" charset="0"/>
+            </a:endParaRPr>
+          </a:p>
+          <a:p>
+            <a:pPr marL="0" indent="0">
+              <a:buClrTx/>
+              <a:buSzTx/>
+              <a:buFontTx/>
+              <a:buNone/>
+            </a:pPr>
             <a:r>
               <a:rPr lang="en-US" altLang="zh-CN" sz="1800">
                 <a:solidFill>
@@ -8040,7 +8066,7 @@
                 <a:latin typeface="Segoe UI" panose="020B0502040204020203" charset="0"/>
                 <a:cs typeface="Segoe UI" panose="020B0502040204020203" charset="0"/>
               </a:rPr>
-              <a:t>ire galben</a:t>
+              <a:t>//green output</a:t>
             </a:r>
             <a:endParaRPr lang="en-US" altLang="zh-CN" sz="1800">
               <a:solidFill>
@@ -8071,10 +8097,10 @@
                 <a:latin typeface="Segoe UI" panose="020B0502040204020203" charset="0"/>
                 <a:cs typeface="Segoe UI" panose="020B0502040204020203" charset="0"/>
               </a:rPr>
-              <a:t>//ie</a:t>
-            </a:r>
-            <a:r>
-              <a:rPr lang="ro-RO" altLang="en-US" sz="1800">
+              <a:t>//</a:t>
+            </a:r>
+            <a:r>
+              <a:rPr sz="1800">
                 <a:solidFill>
                   <a:schemeClr val="tx1">
                     <a:lumMod val="50000"/>
@@ -8084,7 +8110,7 @@
                 <a:latin typeface="Segoe UI" panose="020B0502040204020203" charset="0"/>
                 <a:cs typeface="Segoe UI" panose="020B0502040204020203" charset="0"/>
               </a:rPr>
-              <a:t>ş</a:t>
+              <a:t>red output</a:t>
             </a:r>
             <a:r>
               <a:rPr lang="en-US" altLang="zh-CN" sz="1800">
@@ -8097,7 +8123,7 @@
                 <a:latin typeface="Segoe UI" panose="020B0502040204020203" charset="0"/>
                 <a:cs typeface="Segoe UI" panose="020B0502040204020203" charset="0"/>
               </a:rPr>
-              <a:t>ire verde</a:t>
+              <a:t> </a:t>
             </a:r>
             <a:endParaRPr lang="en-US" altLang="zh-CN" sz="1800">
               <a:solidFill>
@@ -8128,10 +8154,10 @@
                 <a:latin typeface="Segoe UI" panose="020B0502040204020203" charset="0"/>
                 <a:cs typeface="Segoe UI" panose="020B0502040204020203" charset="0"/>
               </a:rPr>
-              <a:t>//ie</a:t>
-            </a:r>
-            <a:r>
-              <a:rPr lang="ro-RO" altLang="en-US" sz="1800">
+              <a:t>//i</a:t>
+            </a:r>
+            <a:r>
+              <a:rPr sz="1800">
                 <a:solidFill>
                   <a:schemeClr val="tx1">
                     <a:lumMod val="50000"/>
@@ -8141,105 +8167,9 @@
                 <a:latin typeface="Segoe UI" panose="020B0502040204020203" charset="0"/>
                 <a:cs typeface="Segoe UI" panose="020B0502040204020203" charset="0"/>
               </a:rPr>
-              <a:t>ş</a:t>
-            </a:r>
-            <a:r>
-              <a:rPr lang="en-US" altLang="zh-CN" sz="1800">
-                <a:solidFill>
-                  <a:schemeClr val="tx1">
-                    <a:lumMod val="50000"/>
-                    <a:lumOff val="50000"/>
-                  </a:schemeClr>
-                </a:solidFill>
-                <a:latin typeface="Segoe UI" panose="020B0502040204020203" charset="0"/>
-                <a:cs typeface="Segoe UI" panose="020B0502040204020203" charset="0"/>
-              </a:rPr>
-              <a:t>ire ro</a:t>
-            </a:r>
-            <a:r>
-              <a:rPr lang="ro-RO" altLang="en-US" sz="1800">
-                <a:solidFill>
-                  <a:schemeClr val="tx1">
-                    <a:lumMod val="50000"/>
-                    <a:lumOff val="50000"/>
-                  </a:schemeClr>
-                </a:solidFill>
-                <a:latin typeface="Segoe UI" panose="020B0502040204020203" charset="0"/>
-                <a:cs typeface="Segoe UI" panose="020B0502040204020203" charset="0"/>
-              </a:rPr>
-              <a:t>ş</a:t>
-            </a:r>
-            <a:r>
-              <a:rPr lang="en-US" altLang="zh-CN" sz="1800">
-                <a:solidFill>
-                  <a:schemeClr val="tx1">
-                    <a:lumMod val="50000"/>
-                    <a:lumOff val="50000"/>
-                  </a:schemeClr>
-                </a:solidFill>
-                <a:latin typeface="Segoe UI" panose="020B0502040204020203" charset="0"/>
-                <a:cs typeface="Segoe UI" panose="020B0502040204020203" charset="0"/>
-              </a:rPr>
-              <a:t>u </a:t>
-            </a:r>
-            <a:endParaRPr lang="en-US" altLang="zh-CN" sz="1800">
-              <a:solidFill>
-                <a:schemeClr val="tx1">
-                  <a:lumMod val="50000"/>
-                  <a:lumOff val="50000"/>
-                </a:schemeClr>
-              </a:solidFill>
-              <a:latin typeface="Segoe UI" panose="020B0502040204020203" charset="0"/>
-              <a:cs typeface="Segoe UI" panose="020B0502040204020203" charset="0"/>
-            </a:endParaRPr>
-          </a:p>
-          <a:p>
-            <a:pPr marL="0" indent="0">
-              <a:buClrTx/>
-              <a:buSzTx/>
-              <a:buFontTx/>
-              <a:buNone/>
-            </a:pPr>
-            <a:r>
-              <a:rPr lang="en-US" altLang="zh-CN" sz="1800">
-                <a:solidFill>
-                  <a:schemeClr val="tx1">
-                    <a:lumMod val="50000"/>
-                    <a:lumOff val="50000"/>
-                  </a:schemeClr>
-                </a:solidFill>
-                <a:latin typeface="Segoe UI" panose="020B0502040204020203" charset="0"/>
-                <a:cs typeface="Segoe UI" panose="020B0502040204020203" charset="0"/>
-              </a:rPr>
-              <a:t>//ie</a:t>
-            </a:r>
-            <a:r>
-              <a:rPr lang="ro-RO" altLang="en-US" sz="1800">
-                <a:solidFill>
-                  <a:schemeClr val="tx1">
-                    <a:lumMod val="50000"/>
-                    <a:lumOff val="50000"/>
-                  </a:schemeClr>
-                </a:solidFill>
-                <a:latin typeface="Segoe UI" panose="020B0502040204020203" charset="0"/>
-                <a:cs typeface="Segoe UI" panose="020B0502040204020203" charset="0"/>
-              </a:rPr>
-              <a:t>ş</a:t>
-            </a:r>
-            <a:r>
-              <a:rPr lang="en-US" altLang="zh-CN" sz="1800">
-                <a:solidFill>
-                  <a:schemeClr val="tx1">
-                    <a:lumMod val="50000"/>
-                    <a:lumOff val="50000"/>
-                  </a:schemeClr>
-                </a:solidFill>
-                <a:latin typeface="Segoe UI" panose="020B0502040204020203" charset="0"/>
-                <a:cs typeface="Segoe UI" panose="020B0502040204020203" charset="0"/>
-              </a:rPr>
-              <a:t>ire albastru</a:t>
-            </a:r>
-            <a:endParaRPr lang="en-US" altLang="zh-CN" sz="1800">
+              <a:t>blue output</a:t>
+            </a:r>
+            <a:endParaRPr sz="1800">
               <a:solidFill>
                 <a:schemeClr val="tx1">
                   <a:lumMod val="50000"/>
@@ -8709,7 +8639,7 @@
                 <a:latin typeface="Gungsuh" panose="02030600000101010101" charset="-127"/>
                 <a:ea typeface="Gungsuh" panose="02030600000101010101" charset="-127"/>
               </a:rPr>
-              <a:t>Variabile globale:</a:t>
+              <a:t>Global Variables:</a:t>
             </a:r>
             <a:endParaRPr lang="en-US" sz="2400" strike="noStrike" noProof="1">
               <a:solidFill>
@@ -8950,7 +8880,7 @@
                 <a:latin typeface="Segoe UI" panose="020B0502040204020203" charset="0"/>
                 <a:cs typeface="Segoe UI" panose="020B0502040204020203" charset="0"/>
               </a:rPr>
-              <a:t>1. Totalitatea notelor pe care le vom folosi ( ex: float C4 =  261.63;);</a:t>
+              <a:t>1. All the notes frequencies that we use (ex: float C4 =  261.63;);</a:t>
             </a:r>
             <a:endParaRPr lang="en-US" altLang="zh-CN">
               <a:solidFill>
@@ -8984,7 +8914,7 @@
                 <a:latin typeface="Segoe UI" panose="020B0502040204020203" charset="0"/>
                 <a:cs typeface="Segoe UI" panose="020B0502040204020203" charset="0"/>
               </a:rPr>
-              <a:t>2. Tempoul pentru melodii(int sec;);</a:t>
+              <a:t>2. The tempo for melodies (int sec;);</a:t>
             </a:r>
             <a:endParaRPr lang="en-US" altLang="zh-CN">
               <a:solidFill>
@@ -9018,20 +8948,20 @@
                 <a:latin typeface="Segoe UI" panose="020B0502040204020203" charset="0"/>
                 <a:cs typeface="Segoe UI" panose="020B0502040204020203" charset="0"/>
               </a:rPr>
-              <a:t>3.Vectorii ce con</a:t>
-            </a:r>
-            <a:r>
-              <a:rPr lang="ro-RO" altLang="en-US">
-                <a:solidFill>
-                  <a:schemeClr val="tx1">
-                    <a:lumMod val="65000"/>
-                    <a:lumOff val="35000"/>
-                  </a:schemeClr>
-                </a:solidFill>
-                <a:latin typeface="Segoe UI" panose="020B0502040204020203" charset="0"/>
-                <a:cs typeface="Segoe UI" panose="020B0502040204020203" charset="0"/>
-              </a:rPr>
-              <a:t>ţ</a:t>
+              <a:t>3. </a:t>
+            </a:r>
+            <a:r>
+              <a:rPr>
+                <a:solidFill>
+                  <a:schemeClr val="tx1">
+                    <a:lumMod val="65000"/>
+                    <a:lumOff val="35000"/>
+                  </a:schemeClr>
+                </a:solidFill>
+                <a:latin typeface="Segoe UI" panose="020B0502040204020203" charset="0"/>
+                <a:cs typeface="Segoe UI" panose="020B0502040204020203" charset="0"/>
+              </a:rPr>
+              <a:t>The arrays which contains all the notes in order and the arrays which contains timing for each note depending on the tempo</a:t>
             </a:r>
             <a:r>
               <a:rPr lang="en-US" altLang="zh-CN">
@@ -9044,163 +8974,7 @@
                 <a:latin typeface="Segoe UI" panose="020B0502040204020203" charset="0"/>
                 <a:cs typeface="Segoe UI" panose="020B0502040204020203" charset="0"/>
               </a:rPr>
-              <a:t>in notele </a:t>
-            </a:r>
-            <a:r>
-              <a:rPr lang="ro-RO" altLang="en-US">
-                <a:solidFill>
-                  <a:schemeClr val="tx1">
-                    <a:lumMod val="65000"/>
-                    <a:lumOff val="35000"/>
-                  </a:schemeClr>
-                </a:solidFill>
-                <a:latin typeface="Segoe UI" panose="020B0502040204020203" charset="0"/>
-                <a:cs typeface="Segoe UI" panose="020B0502040204020203" charset="0"/>
-              </a:rPr>
-              <a:t>î</a:t>
-            </a:r>
-            <a:r>
-              <a:rPr lang="en-US" altLang="zh-CN">
-                <a:solidFill>
-                  <a:schemeClr val="tx1">
-                    <a:lumMod val="65000"/>
-                    <a:lumOff val="35000"/>
-                  </a:schemeClr>
-                </a:solidFill>
-                <a:latin typeface="Segoe UI" panose="020B0502040204020203" charset="0"/>
-                <a:cs typeface="Segoe UI" panose="020B0502040204020203" charset="0"/>
-              </a:rPr>
-              <a:t>n ordine </a:t>
-            </a:r>
-            <a:r>
-              <a:rPr lang="ro-RO" altLang="en-US">
-                <a:solidFill>
-                  <a:schemeClr val="tx1">
-                    <a:lumMod val="65000"/>
-                    <a:lumOff val="35000"/>
-                  </a:schemeClr>
-                </a:solidFill>
-                <a:latin typeface="Segoe UI" panose="020B0502040204020203" charset="0"/>
-                <a:cs typeface="Segoe UI" panose="020B0502040204020203" charset="0"/>
-              </a:rPr>
-              <a:t>ş</a:t>
-            </a:r>
-            <a:r>
-              <a:rPr lang="en-US" altLang="zh-CN">
-                <a:solidFill>
-                  <a:schemeClr val="tx1">
-                    <a:lumMod val="65000"/>
-                    <a:lumOff val="35000"/>
-                  </a:schemeClr>
-                </a:solidFill>
-                <a:latin typeface="Segoe UI" panose="020B0502040204020203" charset="0"/>
-                <a:cs typeface="Segoe UI" panose="020B0502040204020203" charset="0"/>
-              </a:rPr>
-              <a:t>i cei ce con</a:t>
-            </a:r>
-            <a:r>
-              <a:rPr lang="ro-RO" altLang="en-US">
-                <a:solidFill>
-                  <a:schemeClr val="tx1">
-                    <a:lumMod val="65000"/>
-                    <a:lumOff val="35000"/>
-                  </a:schemeClr>
-                </a:solidFill>
-                <a:latin typeface="Segoe UI" panose="020B0502040204020203" charset="0"/>
-                <a:cs typeface="Segoe UI" panose="020B0502040204020203" charset="0"/>
-              </a:rPr>
-              <a:t>ţ</a:t>
-            </a:r>
-            <a:r>
-              <a:rPr lang="en-US" altLang="zh-CN">
-                <a:solidFill>
-                  <a:schemeClr val="tx1">
-                    <a:lumMod val="65000"/>
-                    <a:lumOff val="35000"/>
-                  </a:schemeClr>
-                </a:solidFill>
-                <a:latin typeface="Segoe UI" panose="020B0502040204020203" charset="0"/>
-                <a:cs typeface="Segoe UI" panose="020B0502040204020203" charset="0"/>
-              </a:rPr>
-              <a:t>in timpul necesar fiec</a:t>
-            </a:r>
-            <a:r>
-              <a:rPr lang="ro-RO" altLang="en-US">
-                <a:solidFill>
-                  <a:schemeClr val="tx1">
-                    <a:lumMod val="65000"/>
-                    <a:lumOff val="35000"/>
-                  </a:schemeClr>
-                </a:solidFill>
-                <a:latin typeface="Segoe UI" panose="020B0502040204020203" charset="0"/>
-                <a:cs typeface="Segoe UI" panose="020B0502040204020203" charset="0"/>
-              </a:rPr>
-              <a:t>ă</a:t>
-            </a:r>
-            <a:r>
-              <a:rPr lang="en-US" altLang="zh-CN">
-                <a:solidFill>
-                  <a:schemeClr val="tx1">
-                    <a:lumMod val="65000"/>
-                    <a:lumOff val="35000"/>
-                  </a:schemeClr>
-                </a:solidFill>
-                <a:latin typeface="Segoe UI" panose="020B0502040204020203" charset="0"/>
-                <a:cs typeface="Segoe UI" panose="020B0502040204020203" charset="0"/>
-              </a:rPr>
-              <a:t>rei note </a:t>
-            </a:r>
-            <a:r>
-              <a:rPr lang="ro-RO" altLang="en-US">
-                <a:solidFill>
-                  <a:schemeClr val="tx1">
-                    <a:lumMod val="65000"/>
-                    <a:lumOff val="35000"/>
-                  </a:schemeClr>
-                </a:solidFill>
-                <a:latin typeface="Segoe UI" panose="020B0502040204020203" charset="0"/>
-                <a:cs typeface="Segoe UI" panose="020B0502040204020203" charset="0"/>
-              </a:rPr>
-              <a:t>î</a:t>
-            </a:r>
-            <a:r>
-              <a:rPr lang="en-US" altLang="zh-CN">
-                <a:solidFill>
-                  <a:schemeClr val="tx1">
-                    <a:lumMod val="65000"/>
-                    <a:lumOff val="35000"/>
-                  </a:schemeClr>
-                </a:solidFill>
-                <a:latin typeface="Segoe UI" panose="020B0502040204020203" charset="0"/>
-                <a:cs typeface="Segoe UI" panose="020B0502040204020203" charset="0"/>
-              </a:rPr>
-              <a:t>n func</a:t>
-            </a:r>
-            <a:r>
-              <a:rPr lang="ro-RO" altLang="en-US">
-                <a:solidFill>
-                  <a:schemeClr val="tx1">
-                    <a:lumMod val="65000"/>
-                    <a:lumOff val="35000"/>
-                  </a:schemeClr>
-                </a:solidFill>
-                <a:latin typeface="Segoe UI" panose="020B0502040204020203" charset="0"/>
-                <a:cs typeface="Segoe UI" panose="020B0502040204020203" charset="0"/>
-              </a:rPr>
-              <a:t>ţ</a:t>
-            </a:r>
-            <a:r>
-              <a:rPr lang="en-US" altLang="zh-CN">
-                <a:solidFill>
-                  <a:schemeClr val="tx1">
-                    <a:lumMod val="65000"/>
-                    <a:lumOff val="35000"/>
-                  </a:schemeClr>
-                </a:solidFill>
-                <a:latin typeface="Segoe UI" panose="020B0502040204020203" charset="0"/>
-                <a:cs typeface="Segoe UI" panose="020B0502040204020203" charset="0"/>
-              </a:rPr>
-              <a:t>ie de tempoul melodiei; </a:t>
+              <a:t>; </a:t>
             </a:r>
             <a:endParaRPr lang="en-US" altLang="zh-CN">
               <a:solidFill>
@@ -9238,7 +9012,7 @@
               <a:t>4. </a:t>
             </a:r>
             <a:r>
-              <a:rPr lang="ro-RO" altLang="en-US">
+              <a:rPr lang="en-US">
                 <a:solidFill>
                   <a:schemeClr val="tx1">
                     <a:lumMod val="65000"/>
@@ -9249,7 +9023,7 @@
                 <a:cs typeface="Segoe UI" panose="020B0502040204020203" charset="0"/>
                 <a:sym typeface="+mn-ea"/>
               </a:rPr>
-              <a:t>M</a:t>
+              <a:t>The milliseconds</a:t>
             </a:r>
             <a:r>
               <a:rPr lang="en-US" altLang="zh-CN">
@@ -9263,10 +9037,10 @@
                 <a:cs typeface="Segoe UI" panose="020B0502040204020203" charset="0"/>
                 <a:sym typeface="+mn-ea"/>
               </a:rPr>
-              <a:t>ilisecundele(long int ms = 0;), contorul pentru vectorul de melodii(int i =0;) </a:t>
-            </a:r>
-            <a:r>
-              <a:rPr lang="ro-RO" altLang="en-US">
+              <a:t>(long int ms = 0;), the counter for traversing (??) the </a:t>
+            </a:r>
+            <a:r>
+              <a:rPr lang="en-US" altLang="zh-CN">
                 <a:solidFill>
                   <a:schemeClr val="tx1">
                     <a:lumMod val="65000"/>
@@ -9277,7 +9051,7 @@
                 <a:cs typeface="Segoe UI" panose="020B0502040204020203" charset="0"/>
                 <a:sym typeface="+mn-ea"/>
               </a:rPr>
-              <a:t>ş</a:t>
+              <a:t>melodies arrays</a:t>
             </a:r>
             <a:r>
               <a:rPr lang="en-US" altLang="zh-CN">
@@ -9291,10 +9065,10 @@
                 <a:cs typeface="Segoe UI" panose="020B0502040204020203" charset="0"/>
                 <a:sym typeface="+mn-ea"/>
               </a:rPr>
-              <a:t>i variabila TOP folosit</a:t>
-            </a:r>
-            <a:r>
-              <a:rPr lang="ro-RO" altLang="en-US">
+              <a:t> (int i =0;) and the </a:t>
+            </a:r>
+            <a:r>
+              <a:rPr lang="en-US">
                 <a:solidFill>
                   <a:schemeClr val="tx1">
                     <a:lumMod val="65000"/>
@@ -9305,10 +9079,10 @@
                 <a:cs typeface="Segoe UI" panose="020B0502040204020203" charset="0"/>
                 <a:sym typeface="+mn-ea"/>
               </a:rPr>
-              <a:t>ă</a:t>
-            </a:r>
-            <a:r>
-              <a:rPr lang="en-US" altLang="zh-CN">
+              <a:t>TOP</a:t>
+            </a:r>
+            <a:r>
+              <a:rPr>
                 <a:solidFill>
                   <a:schemeClr val="tx1">
                     <a:lumMod val="65000"/>
@@ -9319,21 +9093,7 @@
                 <a:cs typeface="Segoe UI" panose="020B0502040204020203" charset="0"/>
                 <a:sym typeface="+mn-ea"/>
               </a:rPr>
-              <a:t> la frecven</a:t>
-            </a:r>
-            <a:r>
-              <a:rPr lang="ro-RO" altLang="en-US">
-                <a:solidFill>
-                  <a:schemeClr val="tx1">
-                    <a:lumMod val="65000"/>
-                    <a:lumOff val="35000"/>
-                  </a:schemeClr>
-                </a:solidFill>
-                <a:latin typeface="Segoe UI" panose="020B0502040204020203" charset="0"/>
-                <a:cs typeface="Segoe UI" panose="020B0502040204020203" charset="0"/>
-                <a:sym typeface="+mn-ea"/>
-              </a:rPr>
-              <a:t>ţă</a:t>
+              <a:t> variable used for frequency</a:t>
             </a:r>
             <a:r>
               <a:rPr lang="en-US" altLang="zh-CN">
@@ -9382,7 +9142,35 @@
                 <a:cs typeface="Segoe UI" panose="020B0502040204020203" charset="0"/>
                 <a:sym typeface="+mn-ea"/>
               </a:rPr>
-              <a:t>5.Contorul folosit pentru schimbarea melodiilor (int contor= -1;).</a:t>
+              <a:t>5. T</a:t>
+            </a:r>
+            <a:r>
+              <a:rPr lang="en-US" altLang="zh-CN">
+                <a:solidFill>
+                  <a:schemeClr val="tx1">
+                    <a:lumMod val="65000"/>
+                    <a:lumOff val="35000"/>
+                  </a:schemeClr>
+                </a:solidFill>
+                <a:latin typeface="Segoe UI" panose="020B0502040204020203" charset="0"/>
+                <a:cs typeface="Segoe UI" panose="020B0502040204020203" charset="0"/>
+                <a:sym typeface="+mn-ea"/>
+              </a:rPr>
+              <a:t>he counter for switching the melodies arrays </a:t>
+            </a:r>
+            <a:r>
+              <a:rPr lang="en-US" altLang="zh-CN">
+                <a:solidFill>
+                  <a:schemeClr val="tx1">
+                    <a:lumMod val="65000"/>
+                    <a:lumOff val="35000"/>
+                  </a:schemeClr>
+                </a:solidFill>
+                <a:latin typeface="Segoe UI" panose="020B0502040204020203" charset="0"/>
+                <a:cs typeface="Segoe UI" panose="020B0502040204020203" charset="0"/>
+                <a:sym typeface="+mn-ea"/>
+              </a:rPr>
+              <a:t> (int contor= -1;).</a:t>
             </a:r>
             <a:endParaRPr lang="en-US" altLang="zh-CN">
               <a:solidFill>
@@ -9508,7 +9296,7 @@
           <a:p>
             <a:pPr fontAlgn="base"/>
             <a:r>
-              <a:rPr lang="ro-RO" altLang="en-US" sz="2400" strike="noStrike" noProof="1">
+              <a:rPr lang="en-US" sz="2400">
                 <a:solidFill>
                   <a:schemeClr val="tx1">
                     <a:lumMod val="65000"/>
@@ -9517,11 +9305,12 @@
                 </a:solidFill>
                 <a:latin typeface="Gungsuh" panose="02030600000101010101" charset="-127"/>
                 <a:ea typeface="Gungsuh" panose="02030600000101010101" charset="-127"/>
-              </a:rPr>
-              <a:t>Î</a:t>
-            </a:r>
-            <a:r>
-              <a:rPr lang="en-US" sz="2400" strike="noStrike" noProof="1">
+                <a:sym typeface="+mn-ea"/>
+              </a:rPr>
+              <a:t>I</a:t>
+            </a:r>
+            <a:r>
+              <a:rPr lang="ro-RO" sz="2400">
                 <a:solidFill>
                   <a:schemeClr val="tx1">
                     <a:lumMod val="65000"/>
@@ -9530,8 +9319,22 @@
                 </a:solidFill>
                 <a:latin typeface="Gungsuh" panose="02030600000101010101" charset="-127"/>
                 <a:ea typeface="Gungsuh" panose="02030600000101010101" charset="-127"/>
-              </a:rPr>
-              <a:t>ntreruperi:</a:t>
+                <a:sym typeface="+mn-ea"/>
+              </a:rPr>
+              <a:t>nterrupts</a:t>
+            </a:r>
+            <a:r>
+              <a:rPr lang="en-US" sz="2400" strike="noStrike" noProof="1">
+                <a:solidFill>
+                  <a:schemeClr val="tx1">
+                    <a:lumMod val="65000"/>
+                    <a:lumOff val="35000"/>
+                  </a:schemeClr>
+                </a:solidFill>
+                <a:latin typeface="Gungsuh" panose="02030600000101010101" charset="-127"/>
+                <a:ea typeface="Gungsuh" panose="02030600000101010101" charset="-127"/>
+              </a:rPr>
+              <a:t>:</a:t>
             </a:r>
             <a:endParaRPr lang="en-US" sz="2400" strike="noStrike" noProof="1">
               <a:solidFill>
@@ -9853,10 +9656,10 @@
                 <a:cs typeface="Segoe UI" panose="020B0502040204020203" charset="0"/>
                 <a:sym typeface="+mn-ea"/>
               </a:rPr>
-              <a:t>//Se activeaz</a:t>
-            </a:r>
-            <a:r>
-              <a:rPr lang="ro-RO" altLang="en-US" sz="2400">
+              <a:t>//</a:t>
+            </a:r>
+            <a:r>
+              <a:rPr sz="2400">
                 <a:solidFill>
                   <a:schemeClr val="tx1">
                     <a:lumMod val="50000"/>
@@ -9867,10 +9670,10 @@
                 <a:cs typeface="Segoe UI" panose="020B0502040204020203" charset="0"/>
                 <a:sym typeface="+mn-ea"/>
               </a:rPr>
-              <a:t>ă</a:t>
-            </a:r>
-            <a:r>
-              <a:rPr lang="en-US" altLang="zh-CN" sz="2400">
+              <a:t>Its activating at button press (PD2) and the program is stopping and running the interrupt</a:t>
+            </a:r>
+            <a:r>
+              <a:rPr lang="en-US" sz="2400">
                 <a:solidFill>
                   <a:schemeClr val="tx1">
                     <a:lumMod val="50000"/>
@@ -9881,177 +9684,9 @@
                 <a:cs typeface="Segoe UI" panose="020B0502040204020203" charset="0"/>
                 <a:sym typeface="+mn-ea"/>
               </a:rPr>
-              <a:t> la ap</a:t>
-            </a:r>
-            <a:r>
-              <a:rPr lang="ro-RO" altLang="en-US" sz="2400">
-                <a:solidFill>
-                  <a:schemeClr val="tx1">
-                    <a:lumMod val="50000"/>
-                    <a:lumOff val="50000"/>
-                  </a:schemeClr>
-                </a:solidFill>
-                <a:latin typeface="Segoe UI" panose="020B0502040204020203" charset="0"/>
-                <a:cs typeface="Segoe UI" panose="020B0502040204020203" charset="0"/>
-                <a:sym typeface="+mn-ea"/>
-              </a:rPr>
-              <a:t>ă</a:t>
-            </a:r>
-            <a:r>
-              <a:rPr lang="en-US" altLang="zh-CN" sz="2400">
-                <a:solidFill>
-                  <a:schemeClr val="tx1">
-                    <a:lumMod val="50000"/>
-                    <a:lumOff val="50000"/>
-                  </a:schemeClr>
-                </a:solidFill>
-                <a:latin typeface="Segoe UI" panose="020B0502040204020203" charset="0"/>
-                <a:cs typeface="Segoe UI" panose="020B0502040204020203" charset="0"/>
-                <a:sym typeface="+mn-ea"/>
-              </a:rPr>
-              <a:t>sarea</a:t>
-            </a:r>
-            <a:r>
-              <a:rPr lang="ro-RO" altLang="en-US" sz="2400">
-                <a:solidFill>
-                  <a:schemeClr val="tx1">
-                    <a:lumMod val="50000"/>
-                    <a:lumOff val="50000"/>
-                  </a:schemeClr>
-                </a:solidFill>
-                <a:latin typeface="Segoe UI" panose="020B0502040204020203" charset="0"/>
-                <a:cs typeface="Segoe UI" panose="020B0502040204020203" charset="0"/>
-                <a:sym typeface="+mn-ea"/>
-              </a:rPr>
-              <a:t> </a:t>
-            </a:r>
-            <a:r>
-              <a:rPr lang="en-US" altLang="zh-CN" sz="2400">
-                <a:solidFill>
-                  <a:schemeClr val="tx1">
-                    <a:lumMod val="50000"/>
-                    <a:lumOff val="50000"/>
-                  </a:schemeClr>
-                </a:solidFill>
-                <a:latin typeface="Segoe UI" panose="020B0502040204020203" charset="0"/>
-                <a:cs typeface="Segoe UI" panose="020B0502040204020203" charset="0"/>
-                <a:sym typeface="+mn-ea"/>
-              </a:rPr>
-              <a:t>butonului (PD2) programul se opre</a:t>
-            </a:r>
-            <a:r>
-              <a:rPr lang="ro-RO" altLang="en-US" sz="2400">
-                <a:solidFill>
-                  <a:schemeClr val="tx1">
-                    <a:lumMod val="50000"/>
-                    <a:lumOff val="50000"/>
-                  </a:schemeClr>
-                </a:solidFill>
-                <a:latin typeface="Segoe UI" panose="020B0502040204020203" charset="0"/>
-                <a:cs typeface="Segoe UI" panose="020B0502040204020203" charset="0"/>
-                <a:sym typeface="+mn-ea"/>
-              </a:rPr>
-              <a:t>ş</a:t>
-            </a:r>
-            <a:r>
-              <a:rPr lang="en-US" altLang="zh-CN" sz="2400">
-                <a:solidFill>
-                  <a:schemeClr val="tx1">
-                    <a:lumMod val="50000"/>
-                    <a:lumOff val="50000"/>
-                  </a:schemeClr>
-                </a:solidFill>
-                <a:latin typeface="Segoe UI" panose="020B0502040204020203" charset="0"/>
-                <a:cs typeface="Segoe UI" panose="020B0502040204020203" charset="0"/>
-                <a:sym typeface="+mn-ea"/>
-              </a:rPr>
-              <a:t>te </a:t>
-            </a:r>
-            <a:r>
-              <a:rPr lang="ro-RO" altLang="en-US" sz="2400">
-                <a:solidFill>
-                  <a:schemeClr val="tx1">
-                    <a:lumMod val="50000"/>
-                    <a:lumOff val="50000"/>
-                  </a:schemeClr>
-                </a:solidFill>
-                <a:latin typeface="Segoe UI" panose="020B0502040204020203" charset="0"/>
-                <a:cs typeface="Segoe UI" panose="020B0502040204020203" charset="0"/>
-                <a:sym typeface="+mn-ea"/>
-              </a:rPr>
-              <a:t>ş</a:t>
-            </a:r>
-            <a:r>
-              <a:rPr lang="en-US" altLang="zh-CN" sz="2400">
-                <a:solidFill>
-                  <a:schemeClr val="tx1">
-                    <a:lumMod val="50000"/>
-                    <a:lumOff val="50000"/>
-                  </a:schemeClr>
-                </a:solidFill>
-                <a:latin typeface="Segoe UI" panose="020B0502040204020203" charset="0"/>
-                <a:cs typeface="Segoe UI" panose="020B0502040204020203" charset="0"/>
-                <a:sym typeface="+mn-ea"/>
-              </a:rPr>
-              <a:t>i execut</a:t>
-            </a:r>
-            <a:r>
-              <a:rPr lang="ro-RO" altLang="en-US" sz="2400">
-                <a:solidFill>
-                  <a:schemeClr val="tx1">
-                    <a:lumMod val="50000"/>
-                    <a:lumOff val="50000"/>
-                  </a:schemeClr>
-                </a:solidFill>
-                <a:latin typeface="Segoe UI" panose="020B0502040204020203" charset="0"/>
-                <a:cs typeface="Segoe UI" panose="020B0502040204020203" charset="0"/>
-                <a:sym typeface="+mn-ea"/>
-              </a:rPr>
-              <a:t>ă</a:t>
-            </a:r>
-            <a:r>
-              <a:rPr lang="en-US" altLang="zh-CN" sz="2400">
-                <a:solidFill>
-                  <a:schemeClr val="tx1">
-                    <a:lumMod val="50000"/>
-                    <a:lumOff val="50000"/>
-                  </a:schemeClr>
-                </a:solidFill>
-                <a:latin typeface="Segoe UI" panose="020B0502040204020203" charset="0"/>
-                <a:cs typeface="Segoe UI" panose="020B0502040204020203" charset="0"/>
-                <a:sym typeface="+mn-ea"/>
-              </a:rPr>
-              <a:t> </a:t>
-            </a:r>
-            <a:r>
-              <a:rPr lang="ro-RO" altLang="en-US" sz="2400">
-                <a:solidFill>
-                  <a:schemeClr val="tx1">
-                    <a:lumMod val="50000"/>
-                    <a:lumOff val="50000"/>
-                  </a:schemeClr>
-                </a:solidFill>
-                <a:latin typeface="Segoe UI" panose="020B0502040204020203" charset="0"/>
-                <a:cs typeface="Segoe UI" panose="020B0502040204020203" charset="0"/>
-                <a:sym typeface="+mn-ea"/>
-              </a:rPr>
-              <a:t>î</a:t>
-            </a:r>
-            <a:r>
-              <a:rPr lang="en-US" altLang="zh-CN" sz="2400">
-                <a:solidFill>
-                  <a:schemeClr val="tx1">
-                    <a:lumMod val="50000"/>
-                    <a:lumOff val="50000"/>
-                  </a:schemeClr>
-                </a:solidFill>
-                <a:latin typeface="Segoe UI" panose="020B0502040204020203" charset="0"/>
-                <a:cs typeface="Segoe UI" panose="020B0502040204020203" charset="0"/>
-                <a:sym typeface="+mn-ea"/>
-              </a:rPr>
-              <a:t>ntreruperea</a:t>
-            </a:r>
-            <a:endParaRPr lang="en-US" altLang="zh-CN" sz="2400">
+              <a:t>.</a:t>
+            </a:r>
+            <a:endParaRPr lang="en-US" sz="2400">
               <a:solidFill>
                 <a:schemeClr val="tx1">
                   <a:lumMod val="50000"/>
@@ -10095,7 +9730,7 @@
         </p:nvSpPr>
         <p:spPr>
           <a:xfrm>
-            <a:off x="116840" y="55245"/>
+            <a:off x="260985" y="127635"/>
             <a:ext cx="5301615" cy="657225"/>
           </a:xfrm>
         </p:spPr>
@@ -10114,7 +9749,7 @@
                 <a:latin typeface="Gungsuh" panose="02030600000101010101" charset="-127"/>
                 <a:ea typeface="Gungsuh" panose="02030600000101010101" charset="-127"/>
               </a:rPr>
-              <a:t>Semnalul PWM</a:t>
+              <a:t>PWM signal:</a:t>
             </a:r>
             <a:endParaRPr lang="en-US" sz="2400" strike="noStrike" noProof="1">
               <a:solidFill>
@@ -10141,14 +9776,15 @@
         </p:nvPicPr>
         <p:blipFill>
           <a:blip r:embed="rId1"/>
+          <a:srcRect l="35125" t="36548" r="35920" b="31947"/>
           <a:stretch>
             <a:fillRect/>
           </a:stretch>
         </p:blipFill>
         <p:spPr>
           <a:xfrm>
-            <a:off x="44450" y="847725"/>
-            <a:ext cx="6755130" cy="1767840"/>
+            <a:off x="1485265" y="2794000"/>
+            <a:ext cx="3817620" cy="1087120"/>
           </a:xfrm>
         </p:spPr>
       </p:pic>
@@ -10160,8 +9796,8 @@
         </p:nvSpPr>
         <p:spPr>
           <a:xfrm>
-            <a:off x="120015" y="2647315"/>
-            <a:ext cx="6617970" cy="1565910"/>
+            <a:off x="188595" y="5383530"/>
+            <a:ext cx="6617970" cy="1271270"/>
           </a:xfrm>
           <a:prstGeom prst="rect">
             <a:avLst/>
@@ -10176,30 +9812,42 @@
             <a:spAutoFit/>
           </a:bodyPr>
           <a:p>
+            <a:pPr algn="l">
+              <a:lnSpc>
+                <a:spcPct val="80000"/>
+              </a:lnSpc>
+            </a:pPr>
+            <a:r>
+              <a:rPr lang="en-US" sz="2400">
+                <a:solidFill>
+                  <a:schemeClr val="tx1">
+                    <a:lumMod val="65000"/>
+                    <a:lumOff val="35000"/>
+                  </a:schemeClr>
+                </a:solidFill>
+                <a:latin typeface="Segoe UI" panose="020B0502040204020203" charset="0"/>
+                <a:cs typeface="Segoe UI" panose="020B0502040204020203" charset="0"/>
+                <a:sym typeface="+mn-ea"/>
+              </a:rPr>
+              <a:t>In our case the equation above becomes :</a:t>
+            </a:r>
+            <a:endParaRPr lang="en-US" sz="2400">
+              <a:solidFill>
+                <a:schemeClr val="tx1">
+                  <a:lumMod val="65000"/>
+                  <a:lumOff val="35000"/>
+                </a:schemeClr>
+              </a:solidFill>
+              <a:latin typeface="Segoe UI" panose="020B0502040204020203" charset="0"/>
+              <a:cs typeface="Segoe UI" panose="020B0502040204020203" charset="0"/>
+            </a:endParaRPr>
+          </a:p>
+          <a:p>
             <a:pPr algn="ctr">
               <a:lnSpc>
                 <a:spcPct val="80000"/>
               </a:lnSpc>
             </a:pPr>
-            <a:r>
-              <a:rPr lang="en-US" altLang="zh-CN" sz="2400">
-                <a:gradFill>
-                  <a:gsLst>
-                    <a:gs pos="0">
-                      <a:srgbClr val="E30000"/>
-                    </a:gs>
-                    <a:gs pos="100000">
-                      <a:srgbClr val="760303"/>
-                    </a:gs>
-                  </a:gsLst>
-                  <a:lin ang="5400000" scaled="0"/>
-                </a:gradFill>
-                <a:latin typeface="Segoe UI" panose="020B0502040204020203" charset="0"/>
-                <a:cs typeface="Segoe UI" panose="020B0502040204020203" charset="0"/>
-                <a:sym typeface="Arial" panose="020B0604020202020204" pitchFamily="34" charset="0"/>
-              </a:rPr>
-              <a:t>TOP = 1000000/frecventa </a:t>
-            </a:r>
             <a:endParaRPr lang="en-US" altLang="zh-CN" sz="2400">
               <a:gradFill>
                 <a:gsLst>
@@ -10240,7 +9888,7 @@
                 <a:cs typeface="Segoe UI" panose="020B0502040204020203" charset="0"/>
                 <a:sym typeface="Arial" panose="020B0604020202020204" pitchFamily="34" charset="0"/>
               </a:rPr>
-              <a:t>OCR1A = (TOP+1)/2</a:t>
+              <a:t>TOP = 1000000/frequency </a:t>
             </a:r>
             <a:endParaRPr lang="en-US" altLang="zh-CN" sz="2400">
               <a:gradFill>
@@ -10260,212 +9908,31 @@
             </a:endParaRPr>
           </a:p>
           <a:p>
-            <a:pPr>
+            <a:pPr algn="ctr">
               <a:lnSpc>
                 <a:spcPct val="80000"/>
               </a:lnSpc>
             </a:pPr>
-            <a:endParaRPr lang="en-US" altLang="zh-CN" sz="2400">
-              <a:latin typeface="Segoe UI" panose="020B0502040204020203" charset="0"/>
-              <a:cs typeface="Segoe UI" panose="020B0502040204020203" charset="0"/>
-            </a:endParaRPr>
-          </a:p>
-          <a:p>
-            <a:pPr algn="ctr">
-              <a:lnSpc>
-                <a:spcPct val="80000"/>
-              </a:lnSpc>
-            </a:pPr>
             <a:r>
               <a:rPr lang="en-US" altLang="zh-CN" sz="2400">
-                <a:solidFill>
-                  <a:schemeClr val="tx1">
-                    <a:lumMod val="65000"/>
-                    <a:lumOff val="35000"/>
-                  </a:schemeClr>
-                </a:solidFill>
-                <a:latin typeface="Segoe UI" panose="020B0502040204020203" charset="0"/>
-                <a:cs typeface="Segoe UI" panose="020B0502040204020203" charset="0"/>
-              </a:rPr>
-              <a:t>Unde frecven</a:t>
-            </a:r>
-            <a:r>
-              <a:rPr lang="ro-RO" altLang="en-US" sz="2400">
-                <a:solidFill>
-                  <a:schemeClr val="tx1">
-                    <a:lumMod val="65000"/>
-                    <a:lumOff val="35000"/>
-                  </a:schemeClr>
-                </a:solidFill>
-                <a:latin typeface="Segoe UI" panose="020B0502040204020203" charset="0"/>
-                <a:cs typeface="Segoe UI" panose="020B0502040204020203" charset="0"/>
-              </a:rPr>
-              <a:t>ţ</a:t>
-            </a:r>
-            <a:r>
-              <a:rPr lang="en-US" altLang="zh-CN" sz="2400">
-                <a:solidFill>
-                  <a:schemeClr val="tx1">
-                    <a:lumMod val="65000"/>
-                    <a:lumOff val="35000"/>
-                  </a:schemeClr>
-                </a:solidFill>
-                <a:latin typeface="Segoe UI" panose="020B0502040204020203" charset="0"/>
-                <a:cs typeface="Segoe UI" panose="020B0502040204020203" charset="0"/>
-              </a:rPr>
-              <a:t>a </a:t>
-            </a:r>
-            <a:r>
-              <a:rPr lang="ro-RO" altLang="en-US" sz="2400">
-                <a:solidFill>
-                  <a:schemeClr val="tx1">
-                    <a:lumMod val="65000"/>
-                    <a:lumOff val="35000"/>
-                  </a:schemeClr>
-                </a:solidFill>
-                <a:latin typeface="Segoe UI" panose="020B0502040204020203" charset="0"/>
-                <a:cs typeface="Segoe UI" panose="020B0502040204020203" charset="0"/>
-              </a:rPr>
-              <a:t>î</a:t>
-            </a:r>
-            <a:r>
-              <a:rPr lang="en-US" altLang="zh-CN" sz="2400">
-                <a:solidFill>
-                  <a:schemeClr val="tx1">
-                    <a:lumMod val="65000"/>
-                    <a:lumOff val="35000"/>
-                  </a:schemeClr>
-                </a:solidFill>
-                <a:latin typeface="Segoe UI" panose="020B0502040204020203" charset="0"/>
-                <a:cs typeface="Segoe UI" panose="020B0502040204020203" charset="0"/>
-              </a:rPr>
-              <a:t>nseamn</a:t>
-            </a:r>
-            <a:r>
-              <a:rPr lang="ro-RO" altLang="en-US" sz="2400">
-                <a:solidFill>
-                  <a:schemeClr val="tx1">
-                    <a:lumMod val="65000"/>
-                    <a:lumOff val="35000"/>
-                  </a:schemeClr>
-                </a:solidFill>
-                <a:latin typeface="Segoe UI" panose="020B0502040204020203" charset="0"/>
-                <a:cs typeface="Segoe UI" panose="020B0502040204020203" charset="0"/>
-              </a:rPr>
-              <a:t>ă</a:t>
-            </a:r>
-            <a:r>
-              <a:rPr lang="en-US" altLang="zh-CN" sz="2400">
-                <a:solidFill>
-                  <a:schemeClr val="tx1">
-                    <a:lumMod val="65000"/>
-                    <a:lumOff val="35000"/>
-                  </a:schemeClr>
-                </a:solidFill>
-                <a:latin typeface="Segoe UI" panose="020B0502040204020203" charset="0"/>
-                <a:cs typeface="Segoe UI" panose="020B0502040204020203" charset="0"/>
-              </a:rPr>
-              <a:t> f</a:t>
-            </a:r>
-            <a:r>
-              <a:rPr lang="en-US" altLang="zh-CN" sz="2400">
-                <a:solidFill>
-                  <a:schemeClr val="tx1">
-                    <a:lumMod val="65000"/>
-                    <a:lumOff val="35000"/>
-                  </a:schemeClr>
-                </a:solidFill>
+                <a:gradFill>
+                  <a:gsLst>
+                    <a:gs pos="0">
+                      <a:srgbClr val="E30000"/>
+                    </a:gs>
+                    <a:gs pos="100000">
+                      <a:srgbClr val="760303"/>
+                    </a:gs>
+                  </a:gsLst>
+                  <a:lin ang="5400000" scaled="0"/>
+                </a:gradFill>
                 <a:latin typeface="Segoe UI" panose="020B0502040204020203" charset="0"/>
                 <a:cs typeface="Segoe UI" panose="020B0502040204020203" charset="0"/>
                 <a:sym typeface="Arial" panose="020B0604020202020204" pitchFamily="34" charset="0"/>
               </a:rPr>
-              <a:t>recven</a:t>
-            </a:r>
-            <a:r>
-              <a:rPr lang="ro-RO" altLang="en-US" sz="2400">
-                <a:solidFill>
-                  <a:schemeClr val="tx1">
-                    <a:lumMod val="65000"/>
-                    <a:lumOff val="35000"/>
-                  </a:schemeClr>
-                </a:solidFill>
-                <a:latin typeface="Segoe UI" panose="020B0502040204020203" charset="0"/>
-                <a:cs typeface="Segoe UI" panose="020B0502040204020203" charset="0"/>
-                <a:sym typeface="Arial" panose="020B0604020202020204" pitchFamily="34" charset="0"/>
-              </a:rPr>
-              <a:t>ţ</a:t>
-            </a:r>
-            <a:r>
-              <a:rPr lang="en-US" altLang="zh-CN" sz="2400">
-                <a:solidFill>
-                  <a:schemeClr val="tx1">
-                    <a:lumMod val="65000"/>
-                    <a:lumOff val="35000"/>
-                  </a:schemeClr>
-                </a:solidFill>
-                <a:latin typeface="Segoe UI" panose="020B0502040204020203" charset="0"/>
-                <a:cs typeface="Segoe UI" panose="020B0502040204020203" charset="0"/>
-                <a:sym typeface="Arial" panose="020B0604020202020204" pitchFamily="34" charset="0"/>
-              </a:rPr>
-              <a:t>a pe care dorim s</a:t>
-            </a:r>
-            <a:r>
-              <a:rPr lang="ro-RO" altLang="en-US" sz="2400">
-                <a:solidFill>
-                  <a:schemeClr val="tx1">
-                    <a:lumMod val="65000"/>
-                    <a:lumOff val="35000"/>
-                  </a:schemeClr>
-                </a:solidFill>
-                <a:latin typeface="Segoe UI" panose="020B0502040204020203" charset="0"/>
-                <a:cs typeface="Segoe UI" panose="020B0502040204020203" charset="0"/>
-                <a:sym typeface="Arial" panose="020B0604020202020204" pitchFamily="34" charset="0"/>
-              </a:rPr>
-              <a:t>ă</a:t>
-            </a:r>
-            <a:r>
-              <a:rPr lang="en-US" altLang="zh-CN" sz="2400">
-                <a:solidFill>
-                  <a:schemeClr val="tx1">
-                    <a:lumMod val="65000"/>
-                    <a:lumOff val="35000"/>
-                  </a:schemeClr>
-                </a:solidFill>
-                <a:latin typeface="Segoe UI" panose="020B0502040204020203" charset="0"/>
-                <a:cs typeface="Segoe UI" panose="020B0502040204020203" charset="0"/>
-                <a:sym typeface="Arial" panose="020B0604020202020204" pitchFamily="34" charset="0"/>
-              </a:rPr>
-              <a:t> o implement</a:t>
-            </a:r>
-            <a:r>
-              <a:rPr lang="ro-RO" altLang="en-US" sz="2400">
-                <a:solidFill>
-                  <a:schemeClr val="tx1">
-                    <a:lumMod val="65000"/>
-                    <a:lumOff val="35000"/>
-                  </a:schemeClr>
-                </a:solidFill>
-                <a:latin typeface="Segoe UI" panose="020B0502040204020203" charset="0"/>
-                <a:cs typeface="Segoe UI" panose="020B0502040204020203" charset="0"/>
-                <a:sym typeface="Arial" panose="020B0604020202020204" pitchFamily="34" charset="0"/>
-              </a:rPr>
-              <a:t>ă</a:t>
-            </a:r>
-            <a:r>
-              <a:rPr lang="en-US" altLang="zh-CN" sz="2400">
-                <a:solidFill>
-                  <a:schemeClr val="tx1">
-                    <a:lumMod val="65000"/>
-                    <a:lumOff val="35000"/>
-                  </a:schemeClr>
-                </a:solidFill>
-                <a:latin typeface="Segoe UI" panose="020B0502040204020203" charset="0"/>
-                <a:cs typeface="Segoe UI" panose="020B0502040204020203" charset="0"/>
-                <a:sym typeface="Arial" panose="020B0604020202020204" pitchFamily="34" charset="0"/>
-              </a:rPr>
-              <a:t>m.</a:t>
-            </a:r>
-            <a:endParaRPr lang="en-US" altLang="zh-CN" sz="2400">
+              <a:t>OCR1A = (TOP+1)/2</a:t>
+            </a:r>
+            <a:endParaRPr lang="en-US" sz="2400">
               <a:solidFill>
                 <a:schemeClr val="tx1">
                   <a:lumMod val="65000"/>
@@ -10474,7 +9941,163 @@
               </a:solidFill>
               <a:latin typeface="Segoe UI" panose="020B0502040204020203" charset="0"/>
               <a:cs typeface="Segoe UI" panose="020B0502040204020203" charset="0"/>
-              <a:sym typeface="Arial" panose="020B0604020202020204" pitchFamily="34" charset="0"/>
+            </a:endParaRPr>
+          </a:p>
+        </p:txBody>
+      </p:sp>
+      <p:sp>
+        <p:nvSpPr>
+          <p:cNvPr id="3" name="Text Box 5"/>
+          <p:cNvSpPr txBox="1"/>
+          <p:nvPr/>
+        </p:nvSpPr>
+        <p:spPr>
+          <a:xfrm>
+            <a:off x="188595" y="631190"/>
+            <a:ext cx="6617970" cy="4523105"/>
+          </a:xfrm>
+          <a:prstGeom prst="rect">
+            <a:avLst/>
+          </a:prstGeom>
+          <a:noFill/>
+          <a:ln w="9525">
+            <a:noFill/>
+          </a:ln>
+        </p:spPr>
+        <p:txBody>
+          <a:bodyPr wrap="square" anchor="t" anchorCtr="0">
+            <a:spAutoFit/>
+          </a:bodyPr>
+          <a:p>
+            <a:pPr>
+              <a:lnSpc>
+                <a:spcPct val="100000"/>
+              </a:lnSpc>
+            </a:pPr>
+            <a:r>
+              <a:rPr sz="2400">
+                <a:solidFill>
+                  <a:schemeClr val="tx1">
+                    <a:lumMod val="65000"/>
+                    <a:lumOff val="35000"/>
+                  </a:schemeClr>
+                </a:solidFill>
+                <a:latin typeface="Segoe UI" panose="020B0502040204020203" charset="0"/>
+                <a:cs typeface="Segoe UI" panose="020B0502040204020203" charset="0"/>
+                <a:sym typeface="+mn-ea"/>
+              </a:rPr>
+              <a:t>To generate an output signal in CTC mode, the OC0 pin has to be set as digital output. The output mode for OC0 can be set to toggle every time its find a equality between TCNT0 and OCR0.The signal frequency is defined by the following equation:</a:t>
+            </a:r>
+            <a:endParaRPr sz="2400">
+              <a:solidFill>
+                <a:schemeClr val="tx1">
+                  <a:lumMod val="65000"/>
+                  <a:lumOff val="35000"/>
+                </a:schemeClr>
+              </a:solidFill>
+              <a:latin typeface="Segoe UI" panose="020B0502040204020203" charset="0"/>
+              <a:cs typeface="Segoe UI" panose="020B0502040204020203" charset="0"/>
+              <a:sym typeface="+mn-ea"/>
+            </a:endParaRPr>
+          </a:p>
+          <a:p>
+            <a:pPr>
+              <a:lnSpc>
+                <a:spcPct val="100000"/>
+              </a:lnSpc>
+            </a:pPr>
+            <a:endParaRPr sz="2400">
+              <a:solidFill>
+                <a:schemeClr val="tx1">
+                  <a:lumMod val="65000"/>
+                  <a:lumOff val="35000"/>
+                </a:schemeClr>
+              </a:solidFill>
+              <a:latin typeface="Segoe UI" panose="020B0502040204020203" charset="0"/>
+              <a:cs typeface="Segoe UI" panose="020B0502040204020203" charset="0"/>
+              <a:sym typeface="+mn-ea"/>
+            </a:endParaRPr>
+          </a:p>
+          <a:p>
+            <a:pPr>
+              <a:lnSpc>
+                <a:spcPct val="100000"/>
+              </a:lnSpc>
+            </a:pPr>
+            <a:endParaRPr sz="2400">
+              <a:solidFill>
+                <a:schemeClr val="tx1">
+                  <a:lumMod val="65000"/>
+                  <a:lumOff val="35000"/>
+                </a:schemeClr>
+              </a:solidFill>
+              <a:latin typeface="Segoe UI" panose="020B0502040204020203" charset="0"/>
+              <a:cs typeface="Segoe UI" panose="020B0502040204020203" charset="0"/>
+              <a:sym typeface="+mn-ea"/>
+            </a:endParaRPr>
+          </a:p>
+          <a:p>
+            <a:pPr>
+              <a:lnSpc>
+                <a:spcPct val="100000"/>
+              </a:lnSpc>
+            </a:pPr>
+            <a:endParaRPr sz="2400">
+              <a:solidFill>
+                <a:schemeClr val="tx1">
+                  <a:lumMod val="65000"/>
+                  <a:lumOff val="35000"/>
+                </a:schemeClr>
+              </a:solidFill>
+              <a:latin typeface="Segoe UI" panose="020B0502040204020203" charset="0"/>
+              <a:cs typeface="Segoe UI" panose="020B0502040204020203" charset="0"/>
+              <a:sym typeface="+mn-ea"/>
+            </a:endParaRPr>
+          </a:p>
+          <a:p>
+            <a:pPr>
+              <a:lnSpc>
+                <a:spcPct val="100000"/>
+              </a:lnSpc>
+            </a:pPr>
+            <a:r>
+              <a:rPr lang="en-US" sz="2400">
+                <a:solidFill>
+                  <a:schemeClr val="tx1">
+                    <a:lumMod val="65000"/>
+                    <a:lumOff val="35000"/>
+                  </a:schemeClr>
+                </a:solidFill>
+                <a:latin typeface="Segoe UI" panose="020B0502040204020203" charset="0"/>
+                <a:cs typeface="Segoe UI" panose="020B0502040204020203" charset="0"/>
+                <a:sym typeface="+mn-ea"/>
+              </a:rPr>
+              <a:t>w</a:t>
+            </a:r>
+            <a:r>
+              <a:rPr sz="2400">
+                <a:solidFill>
+                  <a:schemeClr val="tx1">
+                    <a:lumMod val="65000"/>
+                    <a:lumOff val="35000"/>
+                  </a:schemeClr>
+                </a:solidFill>
+                <a:latin typeface="Segoe UI" panose="020B0502040204020203" charset="0"/>
+                <a:cs typeface="Segoe UI" panose="020B0502040204020203" charset="0"/>
+                <a:sym typeface="+mn-ea"/>
+              </a:rPr>
+              <a:t>here the fclk_I/O is the internal sistem clock frequency, N is the prescaler value(1, 8, 64, 256, 1024) and ORC0 is the register value.</a:t>
+            </a:r>
+            <a:endParaRPr sz="2400">
+              <a:solidFill>
+                <a:schemeClr val="tx1">
+                  <a:lumMod val="65000"/>
+                  <a:lumOff val="35000"/>
+                </a:schemeClr>
+              </a:solidFill>
+              <a:latin typeface="Segoe UI" panose="020B0502040204020203" charset="0"/>
+              <a:cs typeface="Segoe UI" panose="020B0502040204020203" charset="0"/>
+              <a:sym typeface="+mn-ea"/>
             </a:endParaRPr>
           </a:p>
         </p:txBody>
@@ -11714,7 +11337,7 @@
         </p:nvSpPr>
         <p:spPr>
           <a:xfrm>
-            <a:off x="-50165" y="4807585"/>
+            <a:off x="-50165" y="4591685"/>
             <a:ext cx="6878320" cy="1386205"/>
           </a:xfrm>
           <a:prstGeom prst="rect">
@@ -11787,7 +11410,7 @@
         </p:nvSpPr>
         <p:spPr>
           <a:xfrm>
-            <a:off x="184150" y="5960110"/>
+            <a:off x="220345" y="5743575"/>
             <a:ext cx="6409690" cy="6536055"/>
           </a:xfrm>
           <a:prstGeom prst="rect">
@@ -13400,7 +13023,7 @@
                 <a:latin typeface="Segoe UI" panose="020B0502040204020203" charset="0"/>
                 <a:cs typeface="Segoe UI" panose="020B0502040204020203" charset="0"/>
               </a:rPr>
-              <a:t>Two of these pins are connected at GND and Vcc on the breadboard and the third pin is connected at the PD2 pin on the Arduino board to verify its state</a:t>
+              <a:t>Two of these pins are connected at GND and Vcc on the breadboard and the third pin is connected at the PD2 on the Arduino board to verify its state</a:t>
             </a:r>
             <a:r>
               <a:rPr lang="en-US">
@@ -13484,24 +13107,18 @@
             <a:r>
               <a:rPr lang="ro-RO" altLang="en-US" u="sng" strike="noStrike" noProof="1">
                 <a:solidFill>
-                  <a:schemeClr val="tx1">
-                    <a:lumMod val="65000"/>
-                    <a:lumOff val="35000"/>
-                  </a:schemeClr>
+                  <a:srgbClr val="595959"/>
                 </a:solidFill>
                 <a:latin typeface="Gungsuh" panose="02030600000101010101" charset="-127"/>
                 <a:ea typeface="Gungsuh" panose="02030600000101010101" charset="-127"/>
                 <a:sym typeface="+mn-ea"/>
               </a:rPr>
-              <a:t>Varianta 1</a:t>
+              <a:t>First version</a:t>
             </a:r>
             <a:r>
               <a:rPr lang="en-US">
                 <a:solidFill>
-                  <a:schemeClr val="tx1">
-                    <a:lumMod val="65000"/>
-                    <a:lumOff val="35000"/>
-                  </a:schemeClr>
+                  <a:srgbClr val="595959"/>
                 </a:solidFill>
                 <a:latin typeface="Gungsuh" panose="02030600000101010101" charset="-127"/>
                 <a:ea typeface="Gungsuh" panose="02030600000101010101" charset="-127"/>
@@ -13510,71 +13127,21 @@
               <a:t>:</a:t>
             </a:r>
             <a:r>
-              <a:rPr lang="ro-RO" altLang="en-US">
-                <a:solidFill>
-                  <a:schemeClr val="tx1">
-                    <a:lumMod val="65000"/>
-                    <a:lumOff val="35000"/>
-                  </a:schemeClr>
+              <a:rPr>
+                <a:solidFill>
+                  <a:srgbClr val="595959"/>
                 </a:solidFill>
                 <a:latin typeface="Gungsuh" panose="02030600000101010101" charset="-127"/>
                 <a:ea typeface="Gungsuh" panose="02030600000101010101" charset="-127"/>
-                <a:sym typeface="+mn-ea"/>
-              </a:rPr>
-              <a:t> </a:t>
-            </a:r>
-            <a:r>
-              <a:rPr lang="en-US" strike="noStrike" noProof="1">
-                <a:solidFill>
-                  <a:schemeClr val="tx1">
-                    <a:lumMod val="65000"/>
-                    <a:lumOff val="35000"/>
-                  </a:schemeClr>
-                </a:solidFill>
-                <a:latin typeface="Gungsuh" panose="02030600000101010101" charset="-127"/>
-                <a:ea typeface="Gungsuh" panose="02030600000101010101" charset="-127"/>
-                <a:sym typeface="+mn-ea"/>
-              </a:rPr>
-              <a:t>Legarea </a:t>
-            </a:r>
-            <a:r>
-              <a:rPr lang="ro-RO" altLang="en-US" strike="noStrike" noProof="1">
-                <a:solidFill>
-                  <a:schemeClr val="tx1">
-                    <a:lumMod val="65000"/>
-                    <a:lumOff val="35000"/>
-                  </a:schemeClr>
-                </a:solidFill>
-                <a:latin typeface="Gungsuh" panose="02030600000101010101" charset="-127"/>
-                <a:ea typeface="Gungsuh" panose="02030600000101010101" charset="-127"/>
-                <a:sym typeface="+mn-ea"/>
-              </a:rPr>
-              <a:t>î</a:t>
-            </a:r>
-            <a:r>
-              <a:rPr lang="en-US" strike="noStrike" noProof="1">
-                <a:solidFill>
-                  <a:schemeClr val="tx1">
-                    <a:lumMod val="65000"/>
-                    <a:lumOff val="35000"/>
-                  </a:schemeClr>
-                </a:solidFill>
-                <a:latin typeface="Gungsuh" panose="02030600000101010101" charset="-127"/>
-                <a:ea typeface="Gungsuh" panose="02030600000101010101" charset="-127"/>
-                <a:sym typeface="+mn-ea"/>
-              </a:rPr>
-              <a:t>n paralel la Vcc</a:t>
-            </a:r>
-            <a:endParaRPr lang="en-US" strike="noStrike" noProof="1">
+              </a:rPr>
+              <a:t>LEDs and resistors in parallel, connected at Vcc</a:t>
+            </a:r>
+            <a:endParaRPr>
               <a:solidFill>
-                <a:schemeClr val="tx1">
-                  <a:lumMod val="65000"/>
-                  <a:lumOff val="35000"/>
-                </a:schemeClr>
+                <a:srgbClr val="595959"/>
               </a:solidFill>
               <a:latin typeface="Gungsuh" panose="02030600000101010101" charset="-127"/>
               <a:ea typeface="Gungsuh" panose="02030600000101010101" charset="-127"/>
-              <a:sym typeface="+mn-ea"/>
             </a:endParaRPr>
           </a:p>
         </p:txBody>
@@ -13662,7 +13229,7 @@
                 <a:ea typeface="Gungsuh" panose="02030600000101010101" charset="-127"/>
                 <a:sym typeface="+mn-ea"/>
               </a:rPr>
-              <a:t>Pro</a:t>
+              <a:t>LED</a:t>
             </a:r>
             <a:r>
               <a:rPr lang="ro-RO" altLang="en-US" sz="3600">
@@ -13676,7 +13243,7 @@
                 <a:ea typeface="Gungsuh" panose="02030600000101010101" charset="-127"/>
                 <a:sym typeface="+mn-ea"/>
               </a:rPr>
-              <a:t>iectarea</a:t>
+              <a:t>s </a:t>
             </a:r>
             <a:r>
               <a:rPr lang="en-US" sz="3600">
@@ -13690,9 +13257,9 @@
                 <a:ea typeface="Gungsuh" panose="02030600000101010101" charset="-127"/>
                 <a:sym typeface="+mn-ea"/>
               </a:rPr>
-              <a:t> LED-urilor</a:t>
-            </a:r>
-            <a:endParaRPr lang="en-US" altLang="en-US" sz="3600" strike="noStrike" noProof="1">
+              <a:t>Design</a:t>
+            </a:r>
+            <a:endParaRPr lang="ro-RO" altLang="en-US" sz="3600" strike="noStrike" noProof="1">
               <a:solidFill>
                 <a:schemeClr val="tx1">
                   <a:lumMod val="65000"/>
@@ -13926,7 +13493,34 @@
                 <a:latin typeface="Segoe UI" panose="020B0502040204020203" charset="0"/>
                 <a:cs typeface="Segoe UI" panose="020B0502040204020203" charset="0"/>
               </a:rPr>
-              <a:t>Presupunând că de fiecare rezistenţă este legat un LED, precum la ultima rezistenţă din poza de mai sus. Tensiunea pe ansamblul rezistenţă-LED înseriate va fi egală cu Vcc (5V), tensiunile pe LED-uri variind în funcţie de rezistenţe.</a:t>
+              <a:t>We assume that each resistor is connected to a LED, like the last resistor from the picture above. The voltage from resistor-LED assembly</a:t>
+            </a:r>
+            <a:r>
+              <a:rPr lang="ro-RO">
+                <a:solidFill>
+                  <a:schemeClr val="tx1">
+                    <a:lumMod val="65000"/>
+                    <a:lumOff val="35000"/>
+                  </a:schemeClr>
+                </a:solidFill>
+                <a:latin typeface="Segoe UI" panose="020B0502040204020203" charset="0"/>
+                <a:cs typeface="Segoe UI" panose="020B0502040204020203" charset="0"/>
+                <a:sym typeface="+mn-ea"/>
+              </a:rPr>
+              <a:t>(or circuit-nush cum suna mai bine) </a:t>
+            </a:r>
+            <a:r>
+              <a:rPr lang="ro-RO">
+                <a:solidFill>
+                  <a:schemeClr val="tx1">
+                    <a:lumMod val="65000"/>
+                    <a:lumOff val="35000"/>
+                  </a:schemeClr>
+                </a:solidFill>
+                <a:latin typeface="Segoe UI" panose="020B0502040204020203" charset="0"/>
+                <a:cs typeface="Segoe UI" panose="020B0502040204020203" charset="0"/>
+              </a:rPr>
+              <a:t>in series is equal with Vcc (5V) and the voltage on the LEDs varies depending on the resistors value.</a:t>
             </a:r>
             <a:endParaRPr lang="ro-RO">
               <a:solidFill>
@@ -13955,7 +13549,7 @@
                 <a:cs typeface="Segoe UI" panose="020B0502040204020203" charset="0"/>
                 <a:sym typeface="+mn-ea"/>
               </a:rPr>
-              <a:t>Această variantă va ţine LED-urile mereu pe ON cât timp circuitul este alimentat, neputând să le controlăm după bunul plac.</a:t>
+              <a:t>In this version, the LEDs are always ON as long as the circuit is powered and we can't control them as we wish.</a:t>
             </a:r>
             <a:endParaRPr lang="ro-RO">
               <a:solidFill>
@@ -13966,6 +13560,7 @@
               </a:solidFill>
               <a:latin typeface="Segoe UI" panose="020B0502040204020203" charset="0"/>
               <a:cs typeface="Segoe UI" panose="020B0502040204020203" charset="0"/>
+              <a:sym typeface="+mn-ea"/>
             </a:endParaRPr>
           </a:p>
         </p:txBody>
@@ -14023,7 +13618,7 @@
         </p:nvSpPr>
         <p:spPr>
           <a:xfrm>
-            <a:off x="186055" y="271145"/>
+            <a:off x="188595" y="127635"/>
             <a:ext cx="6486525" cy="836295"/>
           </a:xfrm>
         </p:spPr>
@@ -14045,7 +13640,7 @@
                 <a:ea typeface="Gungsuh" panose="02030600000101010101" charset="-127"/>
                 <a:sym typeface="+mn-ea"/>
               </a:rPr>
-              <a:t>Varianta 2</a:t>
+              <a:t>Second version</a:t>
             </a:r>
             <a:r>
               <a:rPr lang="en-US">
@@ -14076,67 +13671,30 @@
               <a:t> </a:t>
             </a:r>
             <a:r>
-              <a:rPr lang="en-US" strike="noStrike" noProof="1">
-                <a:solidFill>
-                  <a:schemeClr val="tx1">
-                    <a:lumMod val="65000"/>
-                    <a:lumOff val="35000"/>
-                  </a:schemeClr>
+              <a:rPr>
+                <a:solidFill>
+                  <a:srgbClr val="595959"/>
                 </a:solidFill>
                 <a:latin typeface="Gungsuh" panose="02030600000101010101" charset="-127"/>
                 <a:ea typeface="Gungsuh" panose="02030600000101010101" charset="-127"/>
                 <a:sym typeface="+mn-ea"/>
               </a:rPr>
-              <a:t>Legarea </a:t>
-            </a:r>
-            <a:r>
-              <a:rPr lang="ro-RO" altLang="en-US" strike="noStrike" noProof="1">
-                <a:solidFill>
-                  <a:schemeClr val="tx1">
-                    <a:lumMod val="65000"/>
-                    <a:lumOff val="35000"/>
-                  </a:schemeClr>
+              <a:t>LEDs and resistors in parallel, connected at</a:t>
+            </a:r>
+            <a:r>
+              <a:rPr lang="ro-RO">
+                <a:solidFill>
+                  <a:srgbClr val="595959"/>
                 </a:solidFill>
                 <a:latin typeface="Gungsuh" panose="02030600000101010101" charset="-127"/>
                 <a:ea typeface="Gungsuh" panose="02030600000101010101" charset="-127"/>
                 <a:sym typeface="+mn-ea"/>
               </a:rPr>
-              <a:t>î</a:t>
-            </a:r>
-            <a:r>
-              <a:rPr lang="en-US" strike="noStrike" noProof="1">
-                <a:solidFill>
-                  <a:schemeClr val="tx1">
-                    <a:lumMod val="65000"/>
-                    <a:lumOff val="35000"/>
-                  </a:schemeClr>
-                </a:solidFill>
-                <a:latin typeface="Gungsuh" panose="02030600000101010101" charset="-127"/>
-                <a:ea typeface="Gungsuh" panose="02030600000101010101" charset="-127"/>
-                <a:sym typeface="+mn-ea"/>
-              </a:rPr>
-              <a:t>n paralel</a:t>
-            </a:r>
-            <a:r>
-              <a:rPr lang="ro-RO" altLang="en-US" strike="noStrike" noProof="1">
-                <a:solidFill>
-                  <a:schemeClr val="tx1">
-                    <a:lumMod val="65000"/>
-                    <a:lumOff val="35000"/>
-                  </a:schemeClr>
-                </a:solidFill>
-                <a:latin typeface="Gungsuh" panose="02030600000101010101" charset="-127"/>
-                <a:ea typeface="Gungsuh" panose="02030600000101010101" charset="-127"/>
-                <a:sym typeface="+mn-ea"/>
-              </a:rPr>
-              <a:t> a câte 5 LED-uri pe un pin</a:t>
-            </a:r>
-            <a:endParaRPr lang="ro-RO" altLang="en-US" strike="noStrike" noProof="1">
+              <a:t> a control pin</a:t>
+            </a:r>
+            <a:endParaRPr lang="ro-RO">
               <a:solidFill>
-                <a:schemeClr val="tx1">
-                  <a:lumMod val="65000"/>
-                  <a:lumOff val="35000"/>
-                </a:schemeClr>
+                <a:srgbClr val="595959"/>
               </a:solidFill>
               <a:latin typeface="Gungsuh" panose="02030600000101010101" charset="-127"/>
               <a:ea typeface="Gungsuh" panose="02030600000101010101" charset="-127"/>
@@ -14365,10 +13923,36 @@
                 <a:latin typeface="Segoe UI" panose="020B0502040204020203" charset="0"/>
                 <a:cs typeface="Segoe UI" panose="020B0502040204020203" charset="0"/>
               </a:rPr>
-              <a:t>Presupunem că avem 4 pini pe Arduino de unde vor ieşi semnalele de comandă pentru un ansamblu de 5 rezistenţe înseriate cu 5 LED-uri precum în imaginea de mai sus, fiecare ansamblu din cele 4 reprezentând o culoare(</a:t>
-            </a:r>
-            <a:r>
-              <a:rPr lang="en-US">
+              <a:t>We assume that we have four different control signal for four pins on the Arduino board to controlling five resistor-LED assembly in series, like in the picture above. </a:t>
+            </a:r>
+            <a:r>
+              <a:rPr>
+                <a:solidFill>
+                  <a:schemeClr val="tx1">
+                    <a:lumMod val="65000"/>
+                    <a:lumOff val="35000"/>
+                  </a:schemeClr>
+                </a:solidFill>
+                <a:latin typeface="Segoe UI" panose="020B0502040204020203" charset="0"/>
+                <a:cs typeface="Segoe UI" panose="020B0502040204020203" charset="0"/>
+              </a:rPr>
+              <a:t>Each of these four circuits of five resistor-LED assembly in series represents a color(red, green, yellow and blue).</a:t>
+            </a:r>
+            <a:r>
+              <a:rPr lang="ro-RO">
+                <a:solidFill>
+                  <a:schemeClr val="tx1">
+                    <a:lumMod val="65000"/>
+                    <a:lumOff val="35000"/>
+                  </a:schemeClr>
+                </a:solidFill>
+                <a:latin typeface="Segoe UI" panose="020B0502040204020203" charset="0"/>
+                <a:cs typeface="Segoe UI" panose="020B0502040204020203" charset="0"/>
+              </a:rPr>
+              <a:t> </a:t>
+            </a:r>
+            <a:r>
+              <a:rPr lang="ro-RO">
                 <a:solidFill>
                   <a:schemeClr val="tx1">
                     <a:lumMod val="65000"/>
@@ -14379,147 +13963,7 @@
                 <a:cs typeface="Segoe UI" panose="020B0502040204020203" charset="0"/>
                 <a:sym typeface="+mn-ea"/>
               </a:rPr>
-              <a:t>ro</a:t>
-            </a:r>
-            <a:r>
-              <a:rPr lang="ro-RO" altLang="en-US">
-                <a:solidFill>
-                  <a:schemeClr val="tx1">
-                    <a:lumMod val="65000"/>
-                    <a:lumOff val="35000"/>
-                  </a:schemeClr>
-                </a:solidFill>
-                <a:latin typeface="Segoe UI" panose="020B0502040204020203" charset="0"/>
-                <a:cs typeface="Segoe UI" panose="020B0502040204020203" charset="0"/>
-                <a:sym typeface="+mn-ea"/>
-              </a:rPr>
-              <a:t>ş</a:t>
-            </a:r>
-            <a:r>
-              <a:rPr lang="en-US">
-                <a:solidFill>
-                  <a:schemeClr val="tx1">
-                    <a:lumMod val="65000"/>
-                    <a:lumOff val="35000"/>
-                  </a:schemeClr>
-                </a:solidFill>
-                <a:latin typeface="Segoe UI" panose="020B0502040204020203" charset="0"/>
-                <a:cs typeface="Segoe UI" panose="020B0502040204020203" charset="0"/>
-                <a:sym typeface="+mn-ea"/>
-              </a:rPr>
-              <a:t>u,</a:t>
-            </a:r>
-            <a:r>
-              <a:rPr lang="ro-RO" altLang="en-US">
-                <a:solidFill>
-                  <a:schemeClr val="tx1">
-                    <a:lumMod val="65000"/>
-                    <a:lumOff val="35000"/>
-                  </a:schemeClr>
-                </a:solidFill>
-                <a:latin typeface="Segoe UI" panose="020B0502040204020203" charset="0"/>
-                <a:cs typeface="Segoe UI" panose="020B0502040204020203" charset="0"/>
-                <a:sym typeface="+mn-ea"/>
-              </a:rPr>
-              <a:t> </a:t>
-            </a:r>
-            <a:r>
-              <a:rPr lang="en-US">
-                <a:solidFill>
-                  <a:schemeClr val="tx1">
-                    <a:lumMod val="65000"/>
-                    <a:lumOff val="35000"/>
-                  </a:schemeClr>
-                </a:solidFill>
-                <a:latin typeface="Segoe UI" panose="020B0502040204020203" charset="0"/>
-                <a:cs typeface="Segoe UI" panose="020B0502040204020203" charset="0"/>
-                <a:sym typeface="+mn-ea"/>
-              </a:rPr>
-              <a:t>galben,</a:t>
-            </a:r>
-            <a:r>
-              <a:rPr lang="ro-RO" altLang="en-US">
-                <a:solidFill>
-                  <a:schemeClr val="tx1">
-                    <a:lumMod val="65000"/>
-                    <a:lumOff val="35000"/>
-                  </a:schemeClr>
-                </a:solidFill>
-                <a:latin typeface="Segoe UI" panose="020B0502040204020203" charset="0"/>
-                <a:cs typeface="Segoe UI" panose="020B0502040204020203" charset="0"/>
-                <a:sym typeface="+mn-ea"/>
-              </a:rPr>
-              <a:t> </a:t>
-            </a:r>
-            <a:r>
-              <a:rPr lang="en-US">
-                <a:solidFill>
-                  <a:schemeClr val="tx1">
-                    <a:lumMod val="65000"/>
-                    <a:lumOff val="35000"/>
-                  </a:schemeClr>
-                </a:solidFill>
-                <a:latin typeface="Segoe UI" panose="020B0502040204020203" charset="0"/>
-                <a:cs typeface="Segoe UI" panose="020B0502040204020203" charset="0"/>
-                <a:sym typeface="+mn-ea"/>
-              </a:rPr>
-              <a:t>verde</a:t>
-            </a:r>
-            <a:r>
-              <a:rPr lang="ro-RO" altLang="en-US">
-                <a:solidFill>
-                  <a:schemeClr val="tx1">
-                    <a:lumMod val="65000"/>
-                    <a:lumOff val="35000"/>
-                  </a:schemeClr>
-                </a:solidFill>
-                <a:latin typeface="Segoe UI" panose="020B0502040204020203" charset="0"/>
-                <a:cs typeface="Segoe UI" panose="020B0502040204020203" charset="0"/>
-                <a:sym typeface="+mn-ea"/>
-              </a:rPr>
-              <a:t> sau </a:t>
-            </a:r>
-            <a:r>
-              <a:rPr lang="en-US">
-                <a:solidFill>
-                  <a:schemeClr val="tx1">
-                    <a:lumMod val="65000"/>
-                    <a:lumOff val="35000"/>
-                  </a:schemeClr>
-                </a:solidFill>
-                <a:latin typeface="Segoe UI" panose="020B0502040204020203" charset="0"/>
-                <a:cs typeface="Segoe UI" panose="020B0502040204020203" charset="0"/>
-                <a:sym typeface="+mn-ea"/>
-              </a:rPr>
-              <a:t>albastru)</a:t>
-            </a:r>
-            <a:r>
-              <a:rPr lang="ro-RO" altLang="en-US">
-                <a:solidFill>
-                  <a:schemeClr val="tx1">
-                    <a:lumMod val="65000"/>
-                    <a:lumOff val="35000"/>
-                  </a:schemeClr>
-                </a:solidFill>
-                <a:latin typeface="Segoe UI" panose="020B0502040204020203" charset="0"/>
-                <a:cs typeface="Segoe UI" panose="020B0502040204020203" charset="0"/>
-                <a:sym typeface="+mn-ea"/>
-              </a:rPr>
-              <a:t>. </a:t>
-            </a:r>
-            <a:r>
-              <a:rPr lang="ro-RO">
-                <a:solidFill>
-                  <a:schemeClr val="tx1">
-                    <a:lumMod val="65000"/>
-                    <a:lumOff val="35000"/>
-                  </a:schemeClr>
-                </a:solidFill>
-                <a:latin typeface="Segoe UI" panose="020B0502040204020203" charset="0"/>
-                <a:cs typeface="Segoe UI" panose="020B0502040204020203" charset="0"/>
-                <a:sym typeface="+mn-ea"/>
-              </a:rPr>
-              <a:t>Tensiunea pe ansamblul rezistenţă-LED înseriate va fi egală cu tensiunea de pe pin-ul de comandă când e ON (5V), tensiunile LED-urilor variind în funcţie de rezistenţe.</a:t>
+              <a:t>The resistor-LED assembly in series voltage (or The voltage of resistor-LED assembly in series) is equal with the control signal voltage when is ON (5V) and the LEDs voltage varies depending on resistor values.</a:t>
             </a:r>
             <a:endParaRPr lang="ro-RO">
               <a:solidFill>
@@ -14549,21 +13993,7 @@
                 <a:cs typeface="Segoe UI" panose="020B0502040204020203" charset="0"/>
                 <a:sym typeface="+mn-ea"/>
               </a:rPr>
-              <a:t>Această variantă </a:t>
-            </a:r>
-            <a:r>
-              <a:rPr lang="ro-RO">
-                <a:solidFill>
-                  <a:schemeClr val="tx1">
-                    <a:lumMod val="65000"/>
-                    <a:lumOff val="35000"/>
-                  </a:schemeClr>
-                </a:solidFill>
-                <a:latin typeface="Segoe UI" panose="020B0502040204020203" charset="0"/>
-                <a:cs typeface="Segoe UI" panose="020B0502040204020203" charset="0"/>
-                <a:sym typeface="+mn-ea"/>
-              </a:rPr>
-              <a:t>ne va lăsa să controlăm fiecare set de culoare dupa bunul plac, însă avem prea puţin curent pe un pin de comandă (intensitate de maxim 40 mA) care trebuie împărţit mai apoi la cele 5 ansambluri rezis-</a:t>
+              <a:t>This version allow us to control each color set, but we have to little current on a command pin (max 40mA). </a:t>
             </a:r>
             <a:endParaRPr lang="ro-RO">
               <a:solidFill>
@@ -14647,7 +14077,7 @@
                 <a:cs typeface="Segoe UI" panose="020B0502040204020203" charset="0"/>
                 <a:sym typeface="+mn-ea"/>
               </a:rPr>
-              <a:t>Această variantă presupune legarea în serie  de două ori a câte două LED-uri de o culoare şi o rezistenţă, rămânând un LED pe dinafară, legat în serie cu o rezistenţă, având astfel un curent maxim pe fiecare ansamblu. Excepţie fac LED-urile albastre care, fiind cele mai consumatoare, vor fi legate în serie cu o rezistenţă, fiecare cu pinul ei de comandă. Folosind legea lui Ohm şi ştiind de câţi volţi avem nevoie pentru a aprinde fiecare LED în funcţie de culoarea sa, putem afla valorile rezistenţelor noastre.</a:t>
+              <a:t>This version assume that we have three command pins for three brenches thus: two LEDs and one resistor in series on two branches and one LED with one resistor on the third branch for each color, except the blue LEDs. The blue LEDs consume to much power and we can't connect them in series if we want them to shine at the full potential. In conclusion, we need five command pins for five LED-resistor assembly in series. To find out the value for each resistors I used the Ohm's law and I searched for the voltage for turning on each LED depending on its color.</a:t>
             </a:r>
             <a:endParaRPr lang="ro-RO">
               <a:solidFill>
@@ -14665,7 +14095,21 @@
             <a:pPr marL="0" indent="0" algn="just" fontAlgn="base">
               <a:buNone/>
             </a:pPr>
-            <a:endParaRPr lang="ro-RO">
+            <a:r>
+              <a:rPr>
+                <a:solidFill>
+                  <a:schemeClr val="tx1">
+                    <a:lumMod val="65000"/>
+                    <a:lumOff val="35000"/>
+                  </a:schemeClr>
+                </a:solidFill>
+                <a:latin typeface="Segoe UI" panose="020B0502040204020203" charset="0"/>
+                <a:cs typeface="Segoe UI" panose="020B0502040204020203" charset="0"/>
+                <a:sym typeface="+mn-ea"/>
+              </a:rPr>
+              <a:t>Therefore, we need three pins for red, yellow, green sets and five pins for blue sets, in total fourteen pins to control the LEDs outputs.</a:t>
+            </a:r>
+            <a:endParaRPr>
               <a:solidFill>
                 <a:schemeClr val="tx1">
                   <a:lumMod val="65000"/>
@@ -14682,164 +14126,6 @@
               <a:buNone/>
             </a:pPr>
             <a:r>
-              <a:rPr lang="ro-RO">
-                <a:solidFill>
-                  <a:schemeClr val="tx1">
-                    <a:lumMod val="65000"/>
-                    <a:lumOff val="35000"/>
-                  </a:schemeClr>
-                </a:solidFill>
-                <a:latin typeface="Segoe UI" panose="020B0502040204020203" charset="0"/>
-                <a:cs typeface="Segoe UI" panose="020B0502040204020203" charset="0"/>
-                <a:sym typeface="+mn-ea"/>
-              </a:rPr>
-              <a:t>Astfel vom avea </a:t>
-            </a:r>
-            <a:r>
-              <a:rPr lang="en-US">
-                <a:solidFill>
-                  <a:schemeClr val="tx1">
-                    <a:lumMod val="65000"/>
-                    <a:lumOff val="35000"/>
-                  </a:schemeClr>
-                </a:solidFill>
-                <a:latin typeface="Segoe UI" panose="020B0502040204020203" charset="0"/>
-                <a:cs typeface="Segoe UI" panose="020B0502040204020203" charset="0"/>
-                <a:sym typeface="+mn-ea"/>
-              </a:rPr>
-              <a:t>3 pini necesari pentru ro</a:t>
-            </a:r>
-            <a:r>
-              <a:rPr lang="ro-RO" altLang="en-US">
-                <a:solidFill>
-                  <a:schemeClr val="tx1">
-                    <a:lumMod val="65000"/>
-                    <a:lumOff val="35000"/>
-                  </a:schemeClr>
-                </a:solidFill>
-                <a:latin typeface="Segoe UI" panose="020B0502040204020203" charset="0"/>
-                <a:cs typeface="Segoe UI" panose="020B0502040204020203" charset="0"/>
-                <a:sym typeface="+mn-ea"/>
-              </a:rPr>
-              <a:t>ş</a:t>
-            </a:r>
-            <a:r>
-              <a:rPr lang="en-US">
-                <a:solidFill>
-                  <a:schemeClr val="tx1">
-                    <a:lumMod val="65000"/>
-                    <a:lumOff val="35000"/>
-                  </a:schemeClr>
-                </a:solidFill>
-                <a:latin typeface="Segoe UI" panose="020B0502040204020203" charset="0"/>
-                <a:cs typeface="Segoe UI" panose="020B0502040204020203" charset="0"/>
-                <a:sym typeface="+mn-ea"/>
-              </a:rPr>
-              <a:t>u, galben, verde si 5 pini pentru albastru</a:t>
-            </a:r>
-            <a:r>
-              <a:rPr lang="ro-RO" altLang="en-US">
-                <a:solidFill>
-                  <a:schemeClr val="tx1">
-                    <a:lumMod val="65000"/>
-                    <a:lumOff val="35000"/>
-                  </a:schemeClr>
-                </a:solidFill>
-                <a:latin typeface="Segoe UI" panose="020B0502040204020203" charset="0"/>
-                <a:cs typeface="Segoe UI" panose="020B0502040204020203" charset="0"/>
-                <a:sym typeface="+mn-ea"/>
-              </a:rPr>
-              <a:t>, î</a:t>
-            </a:r>
-            <a:r>
-              <a:rPr lang="en-US">
-                <a:solidFill>
-                  <a:schemeClr val="tx1">
-                    <a:lumMod val="65000"/>
-                    <a:lumOff val="35000"/>
-                  </a:schemeClr>
-                </a:solidFill>
-                <a:latin typeface="Segoe UI" panose="020B0502040204020203" charset="0"/>
-                <a:cs typeface="Segoe UI" panose="020B0502040204020203" charset="0"/>
-                <a:sym typeface="+mn-ea"/>
-              </a:rPr>
-              <a:t>n total fi</a:t>
-            </a:r>
-            <a:r>
-              <a:rPr lang="ro-RO" altLang="en-US">
-                <a:solidFill>
-                  <a:schemeClr val="tx1">
-                    <a:lumMod val="65000"/>
-                    <a:lumOff val="35000"/>
-                  </a:schemeClr>
-                </a:solidFill>
-                <a:latin typeface="Segoe UI" panose="020B0502040204020203" charset="0"/>
-                <a:cs typeface="Segoe UI" panose="020B0502040204020203" charset="0"/>
-                <a:sym typeface="+mn-ea"/>
-              </a:rPr>
-              <a:t>ind</a:t>
-            </a:r>
-            <a:r>
-              <a:rPr lang="en-US">
-                <a:solidFill>
-                  <a:schemeClr val="tx1">
-                    <a:lumMod val="65000"/>
-                    <a:lumOff val="35000"/>
-                  </a:schemeClr>
-                </a:solidFill>
-                <a:latin typeface="Segoe UI" panose="020B0502040204020203" charset="0"/>
-                <a:cs typeface="Segoe UI" panose="020B0502040204020203" charset="0"/>
-                <a:sym typeface="+mn-ea"/>
-              </a:rPr>
-              <a:t> folositi 14 pini pentru LED-uri</a:t>
-            </a:r>
-            <a:r>
-              <a:rPr lang="ro-RO" altLang="en-US">
-                <a:solidFill>
-                  <a:schemeClr val="tx1">
-                    <a:lumMod val="65000"/>
-                    <a:lumOff val="35000"/>
-                  </a:schemeClr>
-                </a:solidFill>
-                <a:latin typeface="Segoe UI" panose="020B0502040204020203" charset="0"/>
-                <a:cs typeface="Segoe UI" panose="020B0502040204020203" charset="0"/>
-                <a:sym typeface="+mn-ea"/>
-              </a:rPr>
-              <a:t>.</a:t>
-            </a:r>
-            <a:endParaRPr lang="ro-RO" altLang="en-US">
-              <a:solidFill>
-                <a:schemeClr val="tx1">
-                  <a:lumMod val="65000"/>
-                  <a:lumOff val="35000"/>
-                </a:schemeClr>
-              </a:solidFill>
-              <a:latin typeface="Segoe UI" panose="020B0502040204020203" charset="0"/>
-              <a:cs typeface="Segoe UI" panose="020B0502040204020203" charset="0"/>
-              <a:sym typeface="+mn-ea"/>
-            </a:endParaRPr>
-          </a:p>
-          <a:p>
-            <a:pPr marL="0" indent="0" algn="just" fontAlgn="base">
-              <a:buNone/>
-            </a:pPr>
-            <a:endParaRPr lang="ro-RO" altLang="en-US">
-              <a:solidFill>
-                <a:schemeClr val="tx1">
-                  <a:lumMod val="65000"/>
-                  <a:lumOff val="35000"/>
-                </a:schemeClr>
-              </a:solidFill>
-              <a:latin typeface="Segoe UI" panose="020B0502040204020203" charset="0"/>
-              <a:cs typeface="Segoe UI" panose="020B0502040204020203" charset="0"/>
-              <a:sym typeface="+mn-ea"/>
-            </a:endParaRPr>
-          </a:p>
-          <a:p>
-            <a:pPr marL="0" indent="0" algn="just" fontAlgn="base">
-              <a:buNone/>
-            </a:pPr>
-            <a:r>
               <a:rPr lang="ro-RO" altLang="en-US" strike="noStrike" noProof="1">
                 <a:solidFill>
                   <a:schemeClr val="tx1">
@@ -14850,23 +14136,8 @@
                 <a:latin typeface="Segoe UI" panose="020B0502040204020203" charset="0"/>
                 <a:cs typeface="Segoe UI" panose="020B0502040204020203" charset="0"/>
               </a:rPr>
-              <a:t>Acestă variantă rămâne şi varianta finală.</a:t>
-            </a:r>
-            <a:endParaRPr lang="en-US" strike="noStrike" noProof="1">
-              <a:solidFill>
-                <a:schemeClr val="tx1">
-                  <a:lumMod val="65000"/>
-                  <a:lumOff val="35000"/>
-                </a:schemeClr>
-              </a:solidFill>
-              <a:latin typeface="Segoe UI" panose="020B0502040204020203" charset="0"/>
-              <a:cs typeface="Segoe UI" panose="020B0502040204020203" charset="0"/>
-            </a:endParaRPr>
-          </a:p>
-          <a:p>
-            <a:pPr marL="0" indent="0" algn="just" fontAlgn="base">
-              <a:buNone/>
-            </a:pPr>
+              <a:t>That being said, this version will remain the final version.</a:t>
+            </a:r>
             <a:r>
               <a:rPr lang="ro-RO">
                 <a:solidFill>
@@ -15121,21 +14392,7 @@
                 <a:latin typeface="Segoe UI" panose="020B0502040204020203" charset="0"/>
                 <a:cs typeface="Segoe UI" panose="020B0502040204020203" charset="0"/>
               </a:rPr>
-              <a:t>tenţă</a:t>
-            </a:r>
-            <a:r>
-              <a:rPr lang="ro-RO">
-                <a:solidFill>
-                  <a:schemeClr val="tx1">
-                    <a:lumMod val="65000"/>
-                    <a:lumOff val="35000"/>
-                  </a:schemeClr>
-                </a:solidFill>
-                <a:latin typeface="Segoe UI" panose="020B0502040204020203" charset="0"/>
-                <a:cs typeface="Segoe UI" panose="020B0502040204020203" charset="0"/>
-                <a:sym typeface="+mn-ea"/>
-              </a:rPr>
-              <a:t>-LED înseriate, rezultând un curent maxim de 8 mA, iar pentru ca o diodă să se aprindă avem nevoie de minim 10 mA.</a:t>
+              <a:t>This current is then split on the five resistor-LED assembly in series, so we have maxim 8mA on a branch, but we need minimum 10mA to turn on a LED..</a:t>
             </a:r>
             <a:endParaRPr lang="ro-RO">
               <a:solidFill>
@@ -15146,23 +14403,6 @@
               </a:solidFill>
               <a:latin typeface="Segoe UI" panose="020B0502040204020203" charset="0"/>
               <a:cs typeface="Segoe UI" panose="020B0502040204020203" charset="0"/>
-              <a:sym typeface="+mn-ea"/>
-            </a:endParaRPr>
-          </a:p>
-          <a:p>
-            <a:pPr marL="0" indent="0" algn="just">
-              <a:buNone/>
-            </a:pPr>
-            <a:endParaRPr lang="ro-RO">
-              <a:solidFill>
-                <a:schemeClr val="tx1">
-                  <a:lumMod val="65000"/>
-                  <a:lumOff val="35000"/>
-                </a:schemeClr>
-              </a:solidFill>
-              <a:latin typeface="Segoe UI" panose="020B0502040204020203" charset="0"/>
-              <a:cs typeface="Segoe UI" panose="020B0502040204020203" charset="0"/>
-              <a:sym typeface="+mn-ea"/>
             </a:endParaRPr>
           </a:p>
           <a:p>
@@ -15420,7 +14660,7 @@
                 <a:ea typeface="Gungsuh" panose="02030600000101010101" charset="-127"/>
                 <a:sym typeface="+mn-ea"/>
               </a:rPr>
-              <a:t>Varianta 3</a:t>
+              <a:t>Third version</a:t>
             </a:r>
             <a:r>
               <a:rPr lang="en-US">
@@ -15451,7 +14691,7 @@
               <a:t> </a:t>
             </a:r>
             <a:r>
-              <a:rPr lang="en-US">
+              <a:rPr lang="ro-RO">
                 <a:solidFill>
                   <a:schemeClr val="tx1">
                     <a:lumMod val="65000"/>
@@ -15462,37 +14702,9 @@
                 <a:ea typeface="Gungsuh" panose="02030600000101010101" charset="-127"/>
                 <a:sym typeface="+mn-ea"/>
               </a:rPr>
-              <a:t>Legarea</a:t>
-            </a:r>
-            <a:r>
-              <a:rPr lang="ro-RO" altLang="en-US">
-                <a:solidFill>
-                  <a:schemeClr val="tx1">
-                    <a:lumMod val="65000"/>
-                    <a:lumOff val="35000"/>
-                  </a:schemeClr>
-                </a:solidFill>
-                <a:latin typeface="Gungsuh" panose="02030600000101010101" charset="-127"/>
-                <a:ea typeface="Gungsuh" panose="02030600000101010101" charset="-127"/>
-                <a:sym typeface="+mn-ea"/>
-              </a:rPr>
-              <a:t> în</a:t>
-            </a:r>
-            <a:r>
-              <a:rPr lang="en-US">
-                <a:solidFill>
-                  <a:schemeClr val="tx1">
-                    <a:lumMod val="65000"/>
-                    <a:lumOff val="35000"/>
-                  </a:schemeClr>
-                </a:solidFill>
-                <a:latin typeface="Gungsuh" panose="02030600000101010101" charset="-127"/>
-                <a:ea typeface="Gungsuh" panose="02030600000101010101" charset="-127"/>
-                <a:sym typeface="+mn-ea"/>
-              </a:rPr>
-              <a:t> serie</a:t>
-            </a:r>
-            <a:endParaRPr lang="en-US" altLang="en-US" strike="noStrike" noProof="1">
+              <a:t>All in series</a:t>
+            </a:r>
+            <a:endParaRPr lang="ro-RO" strike="noStrike" noProof="1">
               <a:solidFill>
                 <a:schemeClr val="tx1">
                   <a:lumMod val="65000"/>
@@ -15596,7 +14808,7 @@
           <a:p>
             <a:pPr fontAlgn="base"/>
             <a:r>
-              <a:rPr lang="en-US" sz="3600">
+              <a:rPr sz="3600">
                 <a:solidFill>
                   <a:schemeClr val="tx1">
                     <a:lumMod val="65000"/>
@@ -15607,23 +14819,9 @@
                 <a:ea typeface="Gungsuh" panose="02030600000101010101" charset="-127"/>
                 <a:sym typeface="+mn-ea"/>
               </a:rPr>
-              <a:t>Alegerea pinilo</a:t>
-            </a:r>
-            <a:r>
-              <a:rPr lang="ro-RO" altLang="en-US" sz="3600">
-                <a:solidFill>
-                  <a:schemeClr val="tx1">
-                    <a:lumMod val="65000"/>
-                    <a:lumOff val="35000"/>
-                  </a:schemeClr>
-                </a:solidFill>
-                <a:latin typeface="Gungsuh" panose="02030600000101010101" charset="-127"/>
-                <a:ea typeface="Gungsuh" panose="02030600000101010101" charset="-127"/>
-                <a:sym typeface="+mn-ea"/>
-              </a:rPr>
-              <a:t>r</a:t>
-            </a:r>
-            <a:endParaRPr lang="ro-RO" altLang="en-US" sz="3600" strike="noStrike" noProof="1">
+              <a:t>Pins choosing</a:t>
+            </a:r>
+            <a:endParaRPr sz="3600">
               <a:solidFill>
                 <a:schemeClr val="tx1">
                   <a:lumMod val="65000"/>
@@ -15847,7 +15045,7 @@
               <a:buNone/>
             </a:pPr>
             <a:r>
-              <a:rPr lang="ro-RO">
+              <a:rPr>
                 <a:solidFill>
                   <a:schemeClr val="tx1">
                     <a:lumMod val="65000"/>
@@ -15858,31 +15056,27 @@
                 <a:cs typeface="Segoe UI" panose="020B0502040204020203" charset="0"/>
                 <a:sym typeface="+mn-ea"/>
               </a:rPr>
-              <a:t>Pinii coloraţi în albastru, roşu, galben şi verde reprezintă pinii aleşi pentru controlul LED-urilor, iar cei cu mov reprezintă restul pinilor aleşi, astfel</a:t>
-            </a:r>
-            <a:r>
-              <a:rPr lang="en-US">
-                <a:solidFill>
-                  <a:schemeClr val="tx1">
-                    <a:lumMod val="65000"/>
-                    <a:lumOff val="35000"/>
-                  </a:schemeClr>
-                </a:solidFill>
-                <a:latin typeface="Gungsuh" panose="02030600000101010101" charset="-127"/>
-                <a:ea typeface="Gungsuh" panose="02030600000101010101" charset="-127"/>
+              <a:t>The blue, red, yellow and green colored pins are the pins chosen for LEDs outputs and the purple ones are chosen for:</a:t>
+            </a:r>
+            <a:r>
+              <a:rPr>
+                <a:solidFill>
+                  <a:schemeClr val="tx1">
+                    <a:lumMod val="65000"/>
+                    <a:lumOff val="35000"/>
+                  </a:schemeClr>
+                </a:solidFill>
                 <a:sym typeface="+mn-ea"/>
               </a:rPr>
-              <a:t>:</a:t>
-            </a:r>
-            <a:endParaRPr lang="en-US">
+              <a:t> </a:t>
+            </a:r>
+            <a:endParaRPr>
               <a:solidFill>
                 <a:schemeClr val="tx1">
                   <a:lumMod val="65000"/>
                   <a:lumOff val="35000"/>
                 </a:schemeClr>
               </a:solidFill>
-              <a:latin typeface="Gungsuh" panose="02030600000101010101" charset="-127"/>
-              <a:ea typeface="Gungsuh" panose="02030600000101010101" charset="-127"/>
               <a:sym typeface="+mn-ea"/>
             </a:endParaRPr>
           </a:p>
@@ -15914,65 +15108,22 @@
                 <a:cs typeface="Segoe UI" panose="020B0502040204020203" charset="0"/>
                 <a:sym typeface="+mn-ea"/>
               </a:rPr>
-              <a:t> - pinul care comandă buzzerul. Acesta are nevoie de un semnal PWM pentru a reda frecvenţa şi durata notelor melodiei. Pentru a ne putea creea PWM-ul după cerinţele problemei, portul trebuie să dispună de </a:t>
-            </a:r>
-            <a:r>
-              <a:rPr lang="en-US" altLang="zh-CN">
-                <a:solidFill>
-                  <a:schemeClr val="tx1">
-                    <a:lumMod val="65000"/>
-                    <a:lumOff val="35000"/>
-                  </a:schemeClr>
-                </a:solidFill>
-                <a:latin typeface="Segoe UI" panose="020B0502040204020203" charset="0"/>
-                <a:cs typeface="Segoe UI" panose="020B0502040204020203" charset="0"/>
-                <a:sym typeface="Arial" panose="020B0604020202020204" pitchFamily="34" charset="0"/>
-              </a:rPr>
-              <a:t>OCR1A</a:t>
-            </a:r>
-            <a:r>
-              <a:rPr lang="ro-RO" altLang="en-US">
-                <a:solidFill>
-                  <a:schemeClr val="tx1">
-                    <a:lumMod val="65000"/>
-                    <a:lumOff val="35000"/>
-                  </a:schemeClr>
-                </a:solidFill>
-                <a:latin typeface="Segoe UI" panose="020B0502040204020203" charset="0"/>
-                <a:cs typeface="Segoe UI" panose="020B0502040204020203" charset="0"/>
-                <a:sym typeface="Arial" panose="020B0604020202020204" pitchFamily="34" charset="0"/>
-              </a:rPr>
-              <a:t> sau </a:t>
-            </a:r>
-            <a:r>
-              <a:rPr lang="en-US" altLang="zh-CN">
-                <a:solidFill>
-                  <a:schemeClr val="tx1">
-                    <a:lumMod val="65000"/>
-                    <a:lumOff val="35000"/>
-                  </a:schemeClr>
-                </a:solidFill>
-                <a:latin typeface="Segoe UI" panose="020B0502040204020203" charset="0"/>
-                <a:cs typeface="Segoe UI" panose="020B0502040204020203" charset="0"/>
-                <a:sym typeface="Arial" panose="020B0604020202020204" pitchFamily="34" charset="0"/>
-              </a:rPr>
-              <a:t>OCR</a:t>
-            </a:r>
-            <a:r>
-              <a:rPr lang="ro-RO" altLang="en-US">
-                <a:solidFill>
-                  <a:schemeClr val="tx1">
-                    <a:lumMod val="65000"/>
-                    <a:lumOff val="35000"/>
-                  </a:schemeClr>
-                </a:solidFill>
-                <a:latin typeface="Segoe UI" panose="020B0502040204020203" charset="0"/>
-                <a:cs typeface="Segoe UI" panose="020B0502040204020203" charset="0"/>
-                <a:sym typeface="Arial" panose="020B0604020202020204" pitchFamily="34" charset="0"/>
-              </a:rPr>
-              <a:t>2B de pe pinul PD3.</a:t>
-            </a:r>
-            <a:endParaRPr lang="en-US" altLang="zh-CN">
+              <a:t> - the buzzer command signal. For this specific command pin we need to create PWM signal as output to play the frequency and the tempo of melodies notes. </a:t>
+            </a:r>
+            <a:r>
+              <a:rPr>
+                <a:solidFill>
+                  <a:schemeClr val="tx1">
+                    <a:lumMod val="65000"/>
+                    <a:lumOff val="35000"/>
+                  </a:schemeClr>
+                </a:solidFill>
+                <a:latin typeface="Segoe UI" panose="020B0502040204020203" charset="0"/>
+                <a:cs typeface="Segoe UI" panose="020B0502040204020203" charset="0"/>
+              </a:rPr>
+              <a:t>So we need a pin with OCR1A or OCR2B (from PD3 pin).</a:t>
+            </a:r>
+            <a:endParaRPr>
               <a:solidFill>
                 <a:schemeClr val="tx1">
                   <a:lumMod val="65000"/>
@@ -15981,7 +15132,6 @@
               </a:solidFill>
               <a:latin typeface="Segoe UI" panose="020B0502040204020203" charset="0"/>
               <a:cs typeface="Segoe UI" panose="020B0502040204020203" charset="0"/>
-              <a:sym typeface="+mn-ea"/>
             </a:endParaRPr>
           </a:p>
           <a:p>
@@ -16014,9 +15164,9 @@
                 <a:cs typeface="Segoe UI" panose="020B0502040204020203" charset="0"/>
                 <a:sym typeface="+mn-ea"/>
               </a:rPr>
-              <a:t> - pinul care citeşte semnalele de intrare de pe buton.</a:t>
-            </a:r>
-            <a:endParaRPr lang="ro-RO">
+              <a:t> - this pin is reading the signal input from the button.</a:t>
+            </a:r>
+            <a:endParaRPr lang="ro-RO" altLang="en-US">
               <a:solidFill>
                 <a:schemeClr val="tx1">
                   <a:lumMod val="65000"/>
@@ -16024,38 +15174,7 @@
                 </a:schemeClr>
               </a:solidFill>
               <a:latin typeface="Segoe UI" panose="020B0502040204020203" charset="0"/>
-              <a:cs typeface="Segoe UI" panose="020B0502040204020203" charset="0"/>
-              <a:sym typeface="+mn-ea"/>
-            </a:endParaRPr>
-          </a:p>
-          <a:p>
-            <a:pPr marL="0" indent="0" algn="just">
-              <a:buNone/>
-            </a:pPr>
-            <a:endParaRPr lang="ro-RO">
-              <a:solidFill>
-                <a:schemeClr val="tx1">
-                  <a:lumMod val="65000"/>
-                  <a:lumOff val="35000"/>
-                </a:schemeClr>
-              </a:solidFill>
-              <a:latin typeface="Segoe UI" panose="020B0502040204020203" charset="0"/>
-              <a:cs typeface="Segoe UI" panose="020B0502040204020203" charset="0"/>
-              <a:sym typeface="+mn-ea"/>
-            </a:endParaRPr>
-          </a:p>
-          <a:p>
-            <a:pPr marL="0" indent="0" algn="just">
-              <a:buNone/>
-            </a:pPr>
-            <a:endParaRPr lang="ro-RO">
-              <a:solidFill>
-                <a:schemeClr val="tx1">
-                  <a:lumMod val="65000"/>
-                  <a:lumOff val="35000"/>
-                </a:schemeClr>
-              </a:solidFill>
-              <a:latin typeface="Segoe UI" panose="020B0502040204020203" charset="0"/>
+              <a:ea typeface="Gungsuh" panose="02030600000101010101" charset="-127"/>
               <a:cs typeface="Segoe UI" panose="020B0502040204020203" charset="0"/>
               <a:sym typeface="+mn-ea"/>
             </a:endParaRPr>

</xml_diff>